<commit_message>
Ajout livrable 10 Rec
</commit_message>
<xml_diff>
--- a/Les 10 recommandations+Comparaison.pptx
+++ b/Les 10 recommandations+Comparaison.pptx
@@ -401,7 +401,7 @@
           <a:p>
             <a:fld id="{78ABE3C1-DBE1-495D-B57B-2849774B866A}" type="datetimeFigureOut">
               <a:rPr lang="en-US" dirty="0"/>
-              <a:t>7/8/2020</a:t>
+              <a:t>7/11/2020</a:t>
             </a:fld>
             <a:endParaRPr lang="en-US" dirty="0"/>
           </a:p>
@@ -810,7 +810,7 @@
           <a:p>
             <a:fld id="{446C117F-5CCF-4837-BE5F-2B92066CAFAF}" type="datetimeFigureOut">
               <a:rPr lang="en-US" dirty="0"/>
-              <a:t>7/8/2020</a:t>
+              <a:t>7/11/2020</a:t>
             </a:fld>
             <a:endParaRPr lang="en-US" dirty="0"/>
           </a:p>
@@ -1141,7 +1141,7 @@
           <a:p>
             <a:fld id="{84EB90BD-B6CE-46B7-997F-7313B992CCDC}" type="datetimeFigureOut">
               <a:rPr lang="en-US" dirty="0"/>
-              <a:t>7/8/2020</a:t>
+              <a:t>7/11/2020</a:t>
             </a:fld>
             <a:endParaRPr lang="en-US" dirty="0"/>
           </a:p>
@@ -1541,7 +1541,7 @@
           <a:p>
             <a:fld id="{CDB9D11F-B188-461D-B23F-39381795C052}" type="datetimeFigureOut">
               <a:rPr lang="en-US" dirty="0"/>
-              <a:t>7/8/2020</a:t>
+              <a:t>7/11/2020</a:t>
             </a:fld>
             <a:endParaRPr lang="en-US" dirty="0"/>
           </a:p>
@@ -2104,7 +2104,7 @@
           <a:p>
             <a:fld id="{52E6D8D9-55A2-4063-B0F3-121F44549695}" type="datetimeFigureOut">
               <a:rPr lang="en-US" dirty="0"/>
-              <a:t>7/8/2020</a:t>
+              <a:t>7/11/2020</a:t>
             </a:fld>
             <a:endParaRPr lang="en-US" dirty="0"/>
           </a:p>
@@ -2780,7 +2780,7 @@
           <a:p>
             <a:fld id="{D4B24536-994D-4021-A283-9F449C0DB509}" type="datetimeFigureOut">
               <a:rPr lang="en-US" dirty="0"/>
-              <a:t>7/8/2020</a:t>
+              <a:t>7/11/2020</a:t>
             </a:fld>
             <a:endParaRPr lang="en-US" dirty="0"/>
           </a:p>
@@ -3688,7 +3688,7 @@
           <a:p>
             <a:fld id="{3CBBBB78-C96F-47B7-AB17-D852CA960AC9}" type="datetimeFigureOut">
               <a:rPr lang="en-US" dirty="0"/>
-              <a:t>7/8/2020</a:t>
+              <a:t>7/11/2020</a:t>
             </a:fld>
             <a:endParaRPr lang="en-US" dirty="0"/>
           </a:p>
@@ -3996,7 +3996,7 @@
           <a:p>
             <a:fld id="{1FA3F48C-C7C6-4055-9F49-3777875E72AE}" type="datetimeFigureOut">
               <a:rPr lang="en-US" dirty="0"/>
-              <a:t>7/8/2020</a:t>
+              <a:t>7/11/2020</a:t>
             </a:fld>
             <a:endParaRPr lang="en-US" dirty="0"/>
           </a:p>
@@ -4255,7 +4255,7 @@
           <a:p>
             <a:fld id="{6178E61D-D431-422C-9764-11DAFE33AB63}" type="datetimeFigureOut">
               <a:rPr lang="en-US" dirty="0"/>
-              <a:t>7/8/2020</a:t>
+              <a:t>7/11/2020</a:t>
             </a:fld>
             <a:endParaRPr lang="en-US" dirty="0"/>
           </a:p>
@@ -4574,7 +4574,7 @@
           <a:p>
             <a:fld id="{12DE42F4-6EEF-4EF7-8ED4-2208F0F89A08}" type="datetimeFigureOut">
               <a:rPr lang="en-US" dirty="0"/>
-              <a:t>7/8/2020</a:t>
+              <a:t>7/11/2020</a:t>
             </a:fld>
             <a:endParaRPr lang="en-US" dirty="0"/>
           </a:p>
@@ -4958,7 +4958,7 @@
           <a:p>
             <a:fld id="{30578ACC-22D6-47C1-A373-4FD133E34F3C}" type="datetimeFigureOut">
               <a:rPr lang="en-US" dirty="0"/>
-              <a:t>7/8/2020</a:t>
+              <a:t>7/11/2020</a:t>
             </a:fld>
             <a:endParaRPr lang="en-US" dirty="0"/>
           </a:p>
@@ -5329,7 +5329,7 @@
           <a:p>
             <a:fld id="{4E5A6C69-6797-4E8A-BF37-F2C3751466E9}" type="datetimeFigureOut">
               <a:rPr lang="en-US" dirty="0"/>
-              <a:t>7/8/2020</a:t>
+              <a:t>7/11/2020</a:t>
             </a:fld>
             <a:endParaRPr lang="en-US" dirty="0"/>
           </a:p>
@@ -5830,7 +5830,7 @@
           <a:p>
             <a:fld id="{D82014A1-A632-4878-A0D3-F52BA7563730}" type="datetimeFigureOut">
               <a:rPr lang="en-US" dirty="0"/>
-              <a:t>7/8/2020</a:t>
+              <a:t>7/11/2020</a:t>
             </a:fld>
             <a:endParaRPr lang="en-US" dirty="0"/>
           </a:p>
@@ -6082,7 +6082,7 @@
           <a:p>
             <a:fld id="{CE99F462-093F-4566-844B-4C71F2739DA5}" type="datetimeFigureOut">
               <a:rPr lang="en-US" dirty="0"/>
-              <a:t>7/8/2020</a:t>
+              <a:t>7/11/2020</a:t>
             </a:fld>
             <a:endParaRPr lang="en-US" dirty="0"/>
           </a:p>
@@ -6240,7 +6240,7 @@
           <a:p>
             <a:fld id="{3D24A7AC-904D-4781-85BA-7D10C17ED021}" type="datetimeFigureOut">
               <a:rPr lang="en-US" dirty="0"/>
-              <a:t>7/8/2020</a:t>
+              <a:t>7/11/2020</a:t>
             </a:fld>
             <a:endParaRPr lang="en-US" dirty="0"/>
           </a:p>
@@ -6625,7 +6625,7 @@
           <a:p>
             <a:fld id="{E331444B-B92B-4E27-8C94-BB93EAF5CB18}" type="datetimeFigureOut">
               <a:rPr lang="en-US" dirty="0"/>
-              <a:t>7/8/2020</a:t>
+              <a:t>7/11/2020</a:t>
             </a:fld>
             <a:endParaRPr lang="en-US" dirty="0"/>
           </a:p>
@@ -7029,7 +7029,7 @@
           <a:p>
             <a:fld id="{363EFA5E-FA76-400D-B3DC-F0BA90E6D107}" type="datetimeFigureOut">
               <a:rPr lang="en-US" dirty="0"/>
-              <a:t>7/8/2020</a:t>
+              <a:t>7/11/2020</a:t>
             </a:fld>
             <a:endParaRPr lang="en-US" dirty="0"/>
           </a:p>
@@ -7268,7 +7268,7 @@
           <a:p>
             <a:fld id="{9D6E9DEC-419B-4CC5-A080-3B06BD5A8291}" type="datetimeFigureOut">
               <a:rPr lang="en-US" dirty="0"/>
-              <a:t>7/8/2020</a:t>
+              <a:t>7/11/2020</a:t>
             </a:fld>
             <a:endParaRPr lang="en-US" dirty="0"/>
           </a:p>
@@ -9105,13 +9105,8 @@
           <a:p>
             <a:r>
               <a:rPr lang="fr-FR" dirty="0"/>
-              <a:t>Revoir toutes les descriptions </a:t>
-            </a:r>
-            <a:r>
-              <a:rPr lang="fr-FR"/>
-              <a:t>des photos</a:t>
-            </a:r>
-            <a:endParaRPr lang="fr-FR" dirty="0"/>
+              <a:t>Revoir toutes les descriptions des photos</a:t>
+            </a:r>
           </a:p>
         </p:txBody>
       </p:sp>
@@ -9213,7 +9208,7 @@
             </a:r>
             <a:r>
               <a:rPr lang="fr-FR" dirty="0"/>
-              <a:t> », puis « description » qui seront les premières informations vus par els visiteurs sur les moteurs de recherche</a:t>
+              <a:t> », puis « description » qui seront les premières informations vues par les visiteurs sur les moteurs de recherche</a:t>
             </a:r>
           </a:p>
           <a:p>

</xml_diff>

<commit_message>
Correction après Validation W3C
</commit_message>
<xml_diff>
--- a/Les 10 recommandations+Comparaison.pptx
+++ b/Les 10 recommandations+Comparaison.pptx
@@ -16,11 +16,22 @@
     <p:sldId id="264" r:id="rId10"/>
     <p:sldId id="265" r:id="rId11"/>
     <p:sldId id="266" r:id="rId12"/>
-    <p:sldId id="267" r:id="rId13"/>
-    <p:sldId id="268" r:id="rId14"/>
-    <p:sldId id="270" r:id="rId15"/>
-    <p:sldId id="271" r:id="rId16"/>
-    <p:sldId id="269" r:id="rId17"/>
+    <p:sldId id="273" r:id="rId13"/>
+    <p:sldId id="267" r:id="rId14"/>
+    <p:sldId id="268" r:id="rId15"/>
+    <p:sldId id="270" r:id="rId16"/>
+    <p:sldId id="271" r:id="rId17"/>
+    <p:sldId id="272" r:id="rId18"/>
+    <p:sldId id="274" r:id="rId19"/>
+    <p:sldId id="276" r:id="rId20"/>
+    <p:sldId id="275" r:id="rId21"/>
+    <p:sldId id="277" r:id="rId22"/>
+    <p:sldId id="278" r:id="rId23"/>
+    <p:sldId id="279" r:id="rId24"/>
+    <p:sldId id="280" r:id="rId25"/>
+    <p:sldId id="281" r:id="rId26"/>
+    <p:sldId id="282" r:id="rId27"/>
+    <p:sldId id="269" r:id="rId28"/>
   </p:sldIdLst>
   <p:sldSz cx="12192000" cy="6858000"/>
   <p:notesSz cx="6858000" cy="9144000"/>
@@ -401,7 +412,7 @@
           <a:p>
             <a:fld id="{78ABE3C1-DBE1-495D-B57B-2849774B866A}" type="datetimeFigureOut">
               <a:rPr lang="en-US" dirty="0"/>
-              <a:t>7/13/2020</a:t>
+              <a:t>7/15/2020</a:t>
             </a:fld>
             <a:endParaRPr lang="en-US" dirty="0"/>
           </a:p>
@@ -810,7 +821,7 @@
           <a:p>
             <a:fld id="{446C117F-5CCF-4837-BE5F-2B92066CAFAF}" type="datetimeFigureOut">
               <a:rPr lang="en-US" dirty="0"/>
-              <a:t>7/13/2020</a:t>
+              <a:t>7/15/2020</a:t>
             </a:fld>
             <a:endParaRPr lang="en-US" dirty="0"/>
           </a:p>
@@ -1141,7 +1152,7 @@
           <a:p>
             <a:fld id="{84EB90BD-B6CE-46B7-997F-7313B992CCDC}" type="datetimeFigureOut">
               <a:rPr lang="en-US" dirty="0"/>
-              <a:t>7/13/2020</a:t>
+              <a:t>7/15/2020</a:t>
             </a:fld>
             <a:endParaRPr lang="en-US" dirty="0"/>
           </a:p>
@@ -1541,7 +1552,7 @@
           <a:p>
             <a:fld id="{CDB9D11F-B188-461D-B23F-39381795C052}" type="datetimeFigureOut">
               <a:rPr lang="en-US" dirty="0"/>
-              <a:t>7/13/2020</a:t>
+              <a:t>7/15/2020</a:t>
             </a:fld>
             <a:endParaRPr lang="en-US" dirty="0"/>
           </a:p>
@@ -2104,7 +2115,7 @@
           <a:p>
             <a:fld id="{52E6D8D9-55A2-4063-B0F3-121F44549695}" type="datetimeFigureOut">
               <a:rPr lang="en-US" dirty="0"/>
-              <a:t>7/13/2020</a:t>
+              <a:t>7/15/2020</a:t>
             </a:fld>
             <a:endParaRPr lang="en-US" dirty="0"/>
           </a:p>
@@ -2780,7 +2791,7 @@
           <a:p>
             <a:fld id="{D4B24536-994D-4021-A283-9F449C0DB509}" type="datetimeFigureOut">
               <a:rPr lang="en-US" dirty="0"/>
-              <a:t>7/13/2020</a:t>
+              <a:t>7/15/2020</a:t>
             </a:fld>
             <a:endParaRPr lang="en-US" dirty="0"/>
           </a:p>
@@ -3688,7 +3699,7 @@
           <a:p>
             <a:fld id="{3CBBBB78-C96F-47B7-AB17-D852CA960AC9}" type="datetimeFigureOut">
               <a:rPr lang="en-US" dirty="0"/>
-              <a:t>7/13/2020</a:t>
+              <a:t>7/15/2020</a:t>
             </a:fld>
             <a:endParaRPr lang="en-US" dirty="0"/>
           </a:p>
@@ -3996,7 +4007,7 @@
           <a:p>
             <a:fld id="{1FA3F48C-C7C6-4055-9F49-3777875E72AE}" type="datetimeFigureOut">
               <a:rPr lang="en-US" dirty="0"/>
-              <a:t>7/13/2020</a:t>
+              <a:t>7/15/2020</a:t>
             </a:fld>
             <a:endParaRPr lang="en-US" dirty="0"/>
           </a:p>
@@ -4255,7 +4266,7 @@
           <a:p>
             <a:fld id="{6178E61D-D431-422C-9764-11DAFE33AB63}" type="datetimeFigureOut">
               <a:rPr lang="en-US" dirty="0"/>
-              <a:t>7/13/2020</a:t>
+              <a:t>7/15/2020</a:t>
             </a:fld>
             <a:endParaRPr lang="en-US" dirty="0"/>
           </a:p>
@@ -4574,7 +4585,7 @@
           <a:p>
             <a:fld id="{12DE42F4-6EEF-4EF7-8ED4-2208F0F89A08}" type="datetimeFigureOut">
               <a:rPr lang="en-US" dirty="0"/>
-              <a:t>7/13/2020</a:t>
+              <a:t>7/15/2020</a:t>
             </a:fld>
             <a:endParaRPr lang="en-US" dirty="0"/>
           </a:p>
@@ -4958,7 +4969,7 @@
           <a:p>
             <a:fld id="{30578ACC-22D6-47C1-A373-4FD133E34F3C}" type="datetimeFigureOut">
               <a:rPr lang="en-US" dirty="0"/>
-              <a:t>7/13/2020</a:t>
+              <a:t>7/15/2020</a:t>
             </a:fld>
             <a:endParaRPr lang="en-US" dirty="0"/>
           </a:p>
@@ -5329,7 +5340,7 @@
           <a:p>
             <a:fld id="{4E5A6C69-6797-4E8A-BF37-F2C3751466E9}" type="datetimeFigureOut">
               <a:rPr lang="en-US" dirty="0"/>
-              <a:t>7/13/2020</a:t>
+              <a:t>7/15/2020</a:t>
             </a:fld>
             <a:endParaRPr lang="en-US" dirty="0"/>
           </a:p>
@@ -5830,7 +5841,7 @@
           <a:p>
             <a:fld id="{D82014A1-A632-4878-A0D3-F52BA7563730}" type="datetimeFigureOut">
               <a:rPr lang="en-US" dirty="0"/>
-              <a:t>7/13/2020</a:t>
+              <a:t>7/15/2020</a:t>
             </a:fld>
             <a:endParaRPr lang="en-US" dirty="0"/>
           </a:p>
@@ -6082,7 +6093,7 @@
           <a:p>
             <a:fld id="{CE99F462-093F-4566-844B-4C71F2739DA5}" type="datetimeFigureOut">
               <a:rPr lang="en-US" dirty="0"/>
-              <a:t>7/13/2020</a:t>
+              <a:t>7/15/2020</a:t>
             </a:fld>
             <a:endParaRPr lang="en-US" dirty="0"/>
           </a:p>
@@ -6240,7 +6251,7 @@
           <a:p>
             <a:fld id="{3D24A7AC-904D-4781-85BA-7D10C17ED021}" type="datetimeFigureOut">
               <a:rPr lang="en-US" dirty="0"/>
-              <a:t>7/13/2020</a:t>
+              <a:t>7/15/2020</a:t>
             </a:fld>
             <a:endParaRPr lang="en-US" dirty="0"/>
           </a:p>
@@ -6625,7 +6636,7 @@
           <a:p>
             <a:fld id="{E331444B-B92B-4E27-8C94-BB93EAF5CB18}" type="datetimeFigureOut">
               <a:rPr lang="en-US" dirty="0"/>
-              <a:t>7/13/2020</a:t>
+              <a:t>7/15/2020</a:t>
             </a:fld>
             <a:endParaRPr lang="en-US" dirty="0"/>
           </a:p>
@@ -7029,7 +7040,7 @@
           <a:p>
             <a:fld id="{363EFA5E-FA76-400D-B3DC-F0BA90E6D107}" type="datetimeFigureOut">
               <a:rPr lang="en-US" dirty="0"/>
-              <a:t>7/13/2020</a:t>
+              <a:t>7/15/2020</a:t>
             </a:fld>
             <a:endParaRPr lang="en-US" dirty="0"/>
           </a:p>
@@ -7268,7 +7279,7 @@
           <a:p>
             <a:fld id="{9D6E9DEC-419B-4CC5-A080-3B06BD5A8291}" type="datetimeFigureOut">
               <a:rPr lang="en-US" dirty="0"/>
-              <a:t>7/13/2020</a:t>
+              <a:t>7/15/2020</a:t>
             </a:fld>
             <a:endParaRPr lang="en-US" dirty="0"/>
           </a:p>
@@ -7985,7 +7996,7 @@
           <p:cNvPr id="2" name="Titre 1">
             <a:extLst>
               <a:ext uri="{FF2B5EF4-FFF2-40B4-BE49-F238E27FC236}">
-                <a16:creationId xmlns:a16="http://schemas.microsoft.com/office/drawing/2014/main" id="{F4AA0B26-5076-49E3-8639-FCC77EEC1B55}"/>
+                <a16:creationId xmlns:a16="http://schemas.microsoft.com/office/drawing/2014/main" id="{0A2BEB8D-D3B8-490D-8C05-5D3C05ED6034}"/>
               </a:ext>
             </a:extLst>
           </p:cNvPr>
@@ -7993,7 +8004,7 @@
             <a:spLocks noGrp="1"/>
           </p:cNvSpPr>
           <p:nvPr>
-            <p:ph type="title"/>
+            <p:ph type="ctrTitle"/>
           </p:nvPr>
         </p:nvSpPr>
         <p:spPr/>
@@ -8010,10 +8021,10 @@
       </p:sp>
       <p:sp>
         <p:nvSpPr>
-          <p:cNvPr id="3" name="Espace réservé du contenu 2">
+          <p:cNvPr id="3" name="Sous-titre 2">
             <a:extLst>
               <a:ext uri="{FF2B5EF4-FFF2-40B4-BE49-F238E27FC236}">
-                <a16:creationId xmlns:a16="http://schemas.microsoft.com/office/drawing/2014/main" id="{116F95D5-C73F-4018-B675-7B599D8F97AB}"/>
+                <a16:creationId xmlns:a16="http://schemas.microsoft.com/office/drawing/2014/main" id="{2300135F-88D3-466D-AD10-192140425968}"/>
               </a:ext>
             </a:extLst>
           </p:cNvPr>
@@ -8021,435 +8032,27 @@
             <a:spLocks noGrp="1"/>
           </p:cNvSpPr>
           <p:nvPr>
-            <p:ph idx="1"/>
+            <p:ph type="subTitle" idx="1"/>
           </p:nvPr>
         </p:nvSpPr>
         <p:spPr/>
         <p:txBody>
           <a:bodyPr>
-            <a:normAutofit fontScale="92500" lnSpcReduction="10000"/>
+            <a:normAutofit/>
           </a:bodyPr>
           <a:lstStyle/>
           <a:p>
             <a:r>
-              <a:rPr lang="fr-FR" sz="3200" dirty="0"/>
-              <a:t>Travailler les mots-clés</a:t>
-            </a:r>
-          </a:p>
-          <a:p>
-            <a:endParaRPr lang="fr-FR" sz="3200" dirty="0"/>
-          </a:p>
-          <a:p>
-            <a:pPr lvl="1"/>
-            <a:r>
-              <a:rPr lang="fr-FR" sz="2400" dirty="0"/>
-              <a:t>Avant : </a:t>
-            </a:r>
-            <a:r>
-              <a:rPr lang="fr-FR" dirty="0">
-                <a:solidFill>
-                  <a:srgbClr val="800000"/>
-                </a:solidFill>
-                <a:latin typeface="Consolas" panose="020B0609020204030204" pitchFamily="49" charset="0"/>
-              </a:rPr>
-              <a:t>&lt;</a:t>
-            </a:r>
-            <a:r>
-              <a:rPr lang="fr-FR" dirty="0" err="1">
-                <a:solidFill>
-                  <a:srgbClr val="800000"/>
-                </a:solidFill>
-                <a:latin typeface="Consolas" panose="020B0609020204030204" pitchFamily="49" charset="0"/>
-              </a:rPr>
-              <a:t>meta</a:t>
-            </a:r>
-            <a:r>
-              <a:rPr lang="fr-FR" dirty="0">
-                <a:solidFill>
-                  <a:srgbClr val="000000"/>
-                </a:solidFill>
-                <a:latin typeface="Consolas" panose="020B0609020204030204" pitchFamily="49" charset="0"/>
-              </a:rPr>
-              <a:t> </a:t>
-            </a:r>
-            <a:r>
-              <a:rPr lang="fr-FR" dirty="0" err="1">
-                <a:solidFill>
-                  <a:schemeClr val="bg2">
-                    <a:lumMod val="40000"/>
-                    <a:lumOff val="60000"/>
-                  </a:schemeClr>
-                </a:solidFill>
-                <a:latin typeface="Consolas" panose="020B0609020204030204" pitchFamily="49" charset="0"/>
-              </a:rPr>
-              <a:t>name</a:t>
-            </a:r>
-            <a:r>
-              <a:rPr lang="fr-FR" dirty="0">
-                <a:solidFill>
-                  <a:srgbClr val="000000"/>
-                </a:solidFill>
-                <a:latin typeface="Consolas" panose="020B0609020204030204" pitchFamily="49" charset="0"/>
-              </a:rPr>
-              <a:t>=</a:t>
-            </a:r>
-            <a:r>
-              <a:rPr lang="fr-FR" dirty="0">
-                <a:solidFill>
-                  <a:srgbClr val="0000FF"/>
-                </a:solidFill>
-                <a:latin typeface="Consolas" panose="020B0609020204030204" pitchFamily="49" charset="0"/>
-              </a:rPr>
-              <a:t>"keywords"</a:t>
-            </a:r>
-            <a:r>
-              <a:rPr lang="fr-FR" dirty="0">
-                <a:solidFill>
-                  <a:schemeClr val="bg2">
-                    <a:lumMod val="40000"/>
-                    <a:lumOff val="60000"/>
-                  </a:schemeClr>
-                </a:solidFill>
-                <a:latin typeface="Consolas" panose="020B0609020204030204" pitchFamily="49" charset="0"/>
-              </a:rPr>
-              <a:t> content</a:t>
-            </a:r>
-            <a:r>
-              <a:rPr lang="fr-FR" dirty="0">
-                <a:solidFill>
-                  <a:srgbClr val="000000"/>
-                </a:solidFill>
-                <a:latin typeface="Consolas" panose="020B0609020204030204" pitchFamily="49" charset="0"/>
-              </a:rPr>
-              <a:t>=</a:t>
-            </a:r>
-            <a:r>
-              <a:rPr lang="fr-FR" dirty="0">
-                <a:solidFill>
-                  <a:srgbClr val="0000FF"/>
-                </a:solidFill>
-                <a:latin typeface="Consolas" panose="020B0609020204030204" pitchFamily="49" charset="0"/>
-              </a:rPr>
-              <a:t>"</a:t>
-            </a:r>
-            <a:r>
-              <a:rPr lang="fr-FR" dirty="0" err="1">
-                <a:solidFill>
-                  <a:srgbClr val="0000FF"/>
-                </a:solidFill>
-                <a:latin typeface="Consolas" panose="020B0609020204030204" pitchFamily="49" charset="0"/>
-              </a:rPr>
-              <a:t>seo</a:t>
-            </a:r>
-            <a:r>
-              <a:rPr lang="fr-FR" dirty="0">
-                <a:solidFill>
-                  <a:srgbClr val="0000FF"/>
-                </a:solidFill>
-                <a:latin typeface="Consolas" panose="020B0609020204030204" pitchFamily="49" charset="0"/>
-              </a:rPr>
-              <a:t>, google, site web, site internet, agence design paris, agence design, agence </a:t>
-            </a:r>
-            <a:r>
-              <a:rPr lang="fr-FR" dirty="0" err="1">
-                <a:solidFill>
-                  <a:srgbClr val="0000FF"/>
-                </a:solidFill>
-                <a:latin typeface="Consolas" panose="020B0609020204030204" pitchFamily="49" charset="0"/>
-              </a:rPr>
-              <a:t>design,agence</a:t>
-            </a:r>
-            <a:r>
-              <a:rPr lang="fr-FR" dirty="0">
-                <a:solidFill>
-                  <a:srgbClr val="0000FF"/>
-                </a:solidFill>
-                <a:latin typeface="Consolas" panose="020B0609020204030204" pitchFamily="49" charset="0"/>
-              </a:rPr>
-              <a:t> </a:t>
-            </a:r>
-            <a:r>
-              <a:rPr lang="fr-FR" dirty="0" err="1">
-                <a:solidFill>
-                  <a:srgbClr val="0000FF"/>
-                </a:solidFill>
-                <a:latin typeface="Consolas" panose="020B0609020204030204" pitchFamily="49" charset="0"/>
-              </a:rPr>
-              <a:t>design,agence</a:t>
-            </a:r>
-            <a:r>
-              <a:rPr lang="fr-FR" dirty="0">
-                <a:solidFill>
-                  <a:srgbClr val="0000FF"/>
-                </a:solidFill>
-                <a:latin typeface="Consolas" panose="020B0609020204030204" pitchFamily="49" charset="0"/>
-              </a:rPr>
-              <a:t> </a:t>
-            </a:r>
-            <a:r>
-              <a:rPr lang="fr-FR" dirty="0" err="1">
-                <a:solidFill>
-                  <a:srgbClr val="0000FF"/>
-                </a:solidFill>
-                <a:latin typeface="Consolas" panose="020B0609020204030204" pitchFamily="49" charset="0"/>
-              </a:rPr>
-              <a:t>design,agence</a:t>
-            </a:r>
-            <a:r>
-              <a:rPr lang="fr-FR" dirty="0">
-                <a:solidFill>
-                  <a:srgbClr val="0000FF"/>
-                </a:solidFill>
-                <a:latin typeface="Consolas" panose="020B0609020204030204" pitchFamily="49" charset="0"/>
-              </a:rPr>
-              <a:t> </a:t>
-            </a:r>
-            <a:r>
-              <a:rPr lang="fr-FR" dirty="0" err="1">
-                <a:solidFill>
-                  <a:srgbClr val="0000FF"/>
-                </a:solidFill>
-                <a:latin typeface="Consolas" panose="020B0609020204030204" pitchFamily="49" charset="0"/>
-              </a:rPr>
-              <a:t>design,agence</a:t>
-            </a:r>
-            <a:r>
-              <a:rPr lang="fr-FR" dirty="0">
-                <a:solidFill>
-                  <a:srgbClr val="0000FF"/>
-                </a:solidFill>
-                <a:latin typeface="Consolas" panose="020B0609020204030204" pitchFamily="49" charset="0"/>
-              </a:rPr>
-              <a:t> </a:t>
-            </a:r>
-            <a:r>
-              <a:rPr lang="fr-FR" dirty="0" err="1">
-                <a:solidFill>
-                  <a:srgbClr val="0000FF"/>
-                </a:solidFill>
-                <a:latin typeface="Consolas" panose="020B0609020204030204" pitchFamily="49" charset="0"/>
-              </a:rPr>
-              <a:t>design,agence</a:t>
-            </a:r>
-            <a:r>
-              <a:rPr lang="fr-FR" dirty="0">
-                <a:solidFill>
-                  <a:srgbClr val="0000FF"/>
-                </a:solidFill>
-                <a:latin typeface="Consolas" panose="020B0609020204030204" pitchFamily="49" charset="0"/>
-              </a:rPr>
-              <a:t> </a:t>
-            </a:r>
-            <a:r>
-              <a:rPr lang="fr-FR" dirty="0" err="1">
-                <a:solidFill>
-                  <a:srgbClr val="0000FF"/>
-                </a:solidFill>
-                <a:latin typeface="Consolas" panose="020B0609020204030204" pitchFamily="49" charset="0"/>
-              </a:rPr>
-              <a:t>design,agence</a:t>
-            </a:r>
-            <a:r>
-              <a:rPr lang="fr-FR" dirty="0">
-                <a:solidFill>
-                  <a:srgbClr val="0000FF"/>
-                </a:solidFill>
-                <a:latin typeface="Consolas" panose="020B0609020204030204" pitchFamily="49" charset="0"/>
-              </a:rPr>
-              <a:t> </a:t>
-            </a:r>
-            <a:r>
-              <a:rPr lang="fr-FR" dirty="0" err="1">
-                <a:solidFill>
-                  <a:srgbClr val="0000FF"/>
-                </a:solidFill>
-                <a:latin typeface="Consolas" panose="020B0609020204030204" pitchFamily="49" charset="0"/>
-              </a:rPr>
-              <a:t>design,agence</a:t>
-            </a:r>
-            <a:r>
-              <a:rPr lang="fr-FR" dirty="0">
-                <a:solidFill>
-                  <a:srgbClr val="0000FF"/>
-                </a:solidFill>
-                <a:latin typeface="Consolas" panose="020B0609020204030204" pitchFamily="49" charset="0"/>
-              </a:rPr>
-              <a:t> design"</a:t>
-            </a:r>
-            <a:r>
-              <a:rPr lang="fr-FR" dirty="0">
-                <a:solidFill>
-                  <a:srgbClr val="800000"/>
-                </a:solidFill>
-                <a:latin typeface="Consolas" panose="020B0609020204030204" pitchFamily="49" charset="0"/>
-              </a:rPr>
-              <a:t>&gt;</a:t>
-            </a:r>
-          </a:p>
-          <a:p>
-            <a:pPr lvl="1"/>
-            <a:endParaRPr lang="fr-FR" dirty="0">
-              <a:solidFill>
-                <a:srgbClr val="800000"/>
-              </a:solidFill>
-              <a:latin typeface="Consolas" panose="020B0609020204030204" pitchFamily="49" charset="0"/>
-            </a:endParaRPr>
-          </a:p>
-          <a:p>
-            <a:pPr lvl="1"/>
-            <a:r>
-              <a:rPr lang="fr-FR" sz="2200" dirty="0"/>
-              <a:t>Après : </a:t>
-            </a:r>
-            <a:r>
-              <a:rPr lang="fr-FR" sz="2200" dirty="0">
-                <a:solidFill>
-                  <a:srgbClr val="800000"/>
-                </a:solidFill>
-                <a:latin typeface="Consolas" panose="020B0609020204030204" pitchFamily="49" charset="0"/>
-              </a:rPr>
-              <a:t>&lt;</a:t>
-            </a:r>
-            <a:r>
-              <a:rPr lang="fr-FR" sz="2200" dirty="0" err="1">
-                <a:solidFill>
-                  <a:srgbClr val="800000"/>
-                </a:solidFill>
-                <a:latin typeface="Consolas" panose="020B0609020204030204" pitchFamily="49" charset="0"/>
-              </a:rPr>
-              <a:t>meta</a:t>
-            </a:r>
-            <a:r>
-              <a:rPr lang="fr-FR" sz="2200" dirty="0">
-                <a:solidFill>
-                  <a:srgbClr val="000000"/>
-                </a:solidFill>
-                <a:latin typeface="Consolas" panose="020B0609020204030204" pitchFamily="49" charset="0"/>
-              </a:rPr>
-              <a:t> </a:t>
-            </a:r>
-            <a:r>
-              <a:rPr lang="fr-FR" sz="2200" dirty="0" err="1">
-                <a:solidFill>
-                  <a:schemeClr val="bg2">
-                    <a:lumMod val="40000"/>
-                    <a:lumOff val="60000"/>
-                  </a:schemeClr>
-                </a:solidFill>
-                <a:latin typeface="Consolas" panose="020B0609020204030204" pitchFamily="49" charset="0"/>
-              </a:rPr>
-              <a:t>name</a:t>
-            </a:r>
-            <a:r>
-              <a:rPr lang="fr-FR" sz="2200" dirty="0">
-                <a:solidFill>
-                  <a:srgbClr val="000000"/>
-                </a:solidFill>
-                <a:latin typeface="Consolas" panose="020B0609020204030204" pitchFamily="49" charset="0"/>
-              </a:rPr>
-              <a:t>=</a:t>
-            </a:r>
-            <a:r>
-              <a:rPr lang="fr-FR" sz="2200" dirty="0">
-                <a:solidFill>
-                  <a:srgbClr val="0000FF"/>
-                </a:solidFill>
-                <a:latin typeface="Consolas" panose="020B0609020204030204" pitchFamily="49" charset="0"/>
-              </a:rPr>
-              <a:t>"keywords"</a:t>
-            </a:r>
-            <a:r>
-              <a:rPr lang="fr-FR" sz="2200" dirty="0">
-                <a:solidFill>
-                  <a:srgbClr val="000000"/>
-                </a:solidFill>
-                <a:latin typeface="Consolas" panose="020B0609020204030204" pitchFamily="49" charset="0"/>
-              </a:rPr>
-              <a:t> </a:t>
-            </a:r>
-            <a:r>
-              <a:rPr lang="fr-FR" sz="2200" dirty="0">
-                <a:solidFill>
-                  <a:schemeClr val="bg2">
-                    <a:lumMod val="40000"/>
-                    <a:lumOff val="60000"/>
-                  </a:schemeClr>
-                </a:solidFill>
-                <a:latin typeface="Consolas" panose="020B0609020204030204" pitchFamily="49" charset="0"/>
-              </a:rPr>
-              <a:t>content</a:t>
-            </a:r>
-            <a:r>
-              <a:rPr lang="fr-FR" sz="2200" dirty="0">
-                <a:solidFill>
-                  <a:srgbClr val="000000"/>
-                </a:solidFill>
-                <a:latin typeface="Consolas" panose="020B0609020204030204" pitchFamily="49" charset="0"/>
-              </a:rPr>
-              <a:t>=</a:t>
-            </a:r>
-            <a:r>
-              <a:rPr lang="fr-FR" sz="2200" dirty="0">
-                <a:solidFill>
-                  <a:srgbClr val="0000FF"/>
-                </a:solidFill>
-                <a:latin typeface="Consolas" panose="020B0609020204030204" pitchFamily="49" charset="0"/>
-              </a:rPr>
-              <a:t>"entreprise webdesign </a:t>
-            </a:r>
-            <a:r>
-              <a:rPr lang="fr-FR" sz="2200" dirty="0" err="1">
-                <a:solidFill>
-                  <a:srgbClr val="0000FF"/>
-                </a:solidFill>
-                <a:latin typeface="Consolas" panose="020B0609020204030204" pitchFamily="49" charset="0"/>
-              </a:rPr>
-              <a:t>Lyon,site</a:t>
-            </a:r>
-            <a:r>
-              <a:rPr lang="fr-FR" sz="2200" dirty="0">
-                <a:solidFill>
-                  <a:srgbClr val="0000FF"/>
-                </a:solidFill>
-                <a:latin typeface="Consolas" panose="020B0609020204030204" pitchFamily="49" charset="0"/>
-              </a:rPr>
-              <a:t> web, site internet, agence design"</a:t>
-            </a:r>
-            <a:r>
-              <a:rPr lang="fr-FR" sz="2200" dirty="0">
-                <a:solidFill>
-                  <a:srgbClr val="800000"/>
-                </a:solidFill>
-                <a:latin typeface="Consolas" panose="020B0609020204030204" pitchFamily="49" charset="0"/>
-              </a:rPr>
-              <a:t>&gt;</a:t>
-            </a:r>
-            <a:endParaRPr lang="fr-FR" sz="2200" dirty="0">
-              <a:solidFill>
-                <a:srgbClr val="000000"/>
-              </a:solidFill>
-              <a:latin typeface="Consolas" panose="020B0609020204030204" pitchFamily="49" charset="0"/>
-            </a:endParaRPr>
-          </a:p>
-          <a:p>
-            <a:pPr lvl="1"/>
-            <a:endParaRPr lang="fr-FR" sz="2400" dirty="0">
-              <a:solidFill>
-                <a:srgbClr val="000000"/>
-              </a:solidFill>
-              <a:latin typeface="Consolas" panose="020B0609020204030204" pitchFamily="49" charset="0"/>
-            </a:endParaRPr>
-          </a:p>
-          <a:p>
-            <a:pPr lvl="1"/>
-            <a:endParaRPr lang="fr-FR" sz="2800" dirty="0"/>
+              <a:rPr lang="fr-FR" sz="2800" dirty="0"/>
+              <a:t>Optimisation d’un site web existant</a:t>
+            </a:r>
           </a:p>
         </p:txBody>
       </p:sp>
     </p:spTree>
     <p:extLst>
       <p:ext uri="{BB962C8B-B14F-4D97-AF65-F5344CB8AC3E}">
-        <p14:creationId xmlns:p14="http://schemas.microsoft.com/office/powerpoint/2010/main" val="1091619205"/>
+        <p14:creationId xmlns:p14="http://schemas.microsoft.com/office/powerpoint/2010/main" val="1934747441"/>
       </p:ext>
     </p:extLst>
   </p:cSld>
@@ -8499,7 +8102,7 @@
           <a:p>
             <a:r>
               <a:rPr lang="fr-FR" dirty="0"/>
-              <a:t>Comparaison Avant-Après</a:t>
+              <a:t>Travailler les mots clés</a:t>
             </a:r>
           </a:p>
         </p:txBody>
@@ -8520,112 +8123,432 @@
             <p:ph idx="1"/>
           </p:nvPr>
         </p:nvSpPr>
-        <p:spPr/>
+        <p:spPr>
+          <a:xfrm>
+            <a:off x="680321" y="2336872"/>
+            <a:ext cx="9613861" cy="3767899"/>
+          </a:xfrm>
+        </p:spPr>
         <p:txBody>
           <a:bodyPr>
             <a:normAutofit/>
           </a:bodyPr>
           <a:lstStyle/>
           <a:p>
-            <a:r>
-              <a:rPr lang="fr-FR" sz="3200" dirty="0"/>
-              <a:t>Optimiser les balises métas</a:t>
+            <a:pPr marL="457200" lvl="1" indent="0">
+              <a:buNone/>
+            </a:pPr>
+            <a:r>
+              <a:rPr lang="fr-FR" sz="2800" dirty="0"/>
+              <a:t>Avant : </a:t>
+            </a:r>
+            <a:r>
+              <a:rPr lang="fr-FR" sz="2400" dirty="0">
+                <a:solidFill>
+                  <a:srgbClr val="800000"/>
+                </a:solidFill>
+                <a:latin typeface="Consolas" panose="020B0609020204030204" pitchFamily="49" charset="0"/>
+              </a:rPr>
+              <a:t>&lt;</a:t>
+            </a:r>
+            <a:r>
+              <a:rPr lang="fr-FR" sz="2400" dirty="0" err="1">
+                <a:solidFill>
+                  <a:srgbClr val="800000"/>
+                </a:solidFill>
+                <a:latin typeface="Consolas" panose="020B0609020204030204" pitchFamily="49" charset="0"/>
+              </a:rPr>
+              <a:t>meta</a:t>
+            </a:r>
+            <a:r>
+              <a:rPr lang="fr-FR" sz="2400" dirty="0">
+                <a:solidFill>
+                  <a:srgbClr val="000000"/>
+                </a:solidFill>
+                <a:latin typeface="Consolas" panose="020B0609020204030204" pitchFamily="49" charset="0"/>
+              </a:rPr>
+              <a:t> </a:t>
+            </a:r>
+            <a:r>
+              <a:rPr lang="fr-FR" sz="2400" dirty="0" err="1">
+                <a:solidFill>
+                  <a:schemeClr val="bg2">
+                    <a:lumMod val="40000"/>
+                    <a:lumOff val="60000"/>
+                  </a:schemeClr>
+                </a:solidFill>
+                <a:latin typeface="Consolas" panose="020B0609020204030204" pitchFamily="49" charset="0"/>
+              </a:rPr>
+              <a:t>name</a:t>
+            </a:r>
+            <a:r>
+              <a:rPr lang="fr-FR" sz="2400" dirty="0">
+                <a:solidFill>
+                  <a:srgbClr val="000000"/>
+                </a:solidFill>
+                <a:latin typeface="Consolas" panose="020B0609020204030204" pitchFamily="49" charset="0"/>
+              </a:rPr>
+              <a:t>=</a:t>
+            </a:r>
+            <a:r>
+              <a:rPr lang="fr-FR" sz="2400" dirty="0">
+                <a:solidFill>
+                  <a:srgbClr val="0000FF"/>
+                </a:solidFill>
+                <a:latin typeface="Consolas" panose="020B0609020204030204" pitchFamily="49" charset="0"/>
+              </a:rPr>
+              <a:t>"keywords"</a:t>
+            </a:r>
+            <a:r>
+              <a:rPr lang="fr-FR" sz="2400" dirty="0">
+                <a:solidFill>
+                  <a:schemeClr val="bg2">
+                    <a:lumMod val="40000"/>
+                    <a:lumOff val="60000"/>
+                  </a:schemeClr>
+                </a:solidFill>
+                <a:latin typeface="Consolas" panose="020B0609020204030204" pitchFamily="49" charset="0"/>
+              </a:rPr>
+              <a:t> content</a:t>
+            </a:r>
+            <a:r>
+              <a:rPr lang="fr-FR" sz="2400" dirty="0">
+                <a:solidFill>
+                  <a:srgbClr val="000000"/>
+                </a:solidFill>
+                <a:latin typeface="Consolas" panose="020B0609020204030204" pitchFamily="49" charset="0"/>
+              </a:rPr>
+              <a:t>=</a:t>
+            </a:r>
+            <a:r>
+              <a:rPr lang="fr-FR" sz="2400" dirty="0">
+                <a:solidFill>
+                  <a:srgbClr val="0000FF"/>
+                </a:solidFill>
+                <a:latin typeface="Consolas" panose="020B0609020204030204" pitchFamily="49" charset="0"/>
+              </a:rPr>
+              <a:t>"</a:t>
+            </a:r>
+            <a:r>
+              <a:rPr lang="fr-FR" sz="2400" dirty="0" err="1">
+                <a:solidFill>
+                  <a:srgbClr val="0000FF"/>
+                </a:solidFill>
+                <a:latin typeface="Consolas" panose="020B0609020204030204" pitchFamily="49" charset="0"/>
+              </a:rPr>
+              <a:t>seo</a:t>
+            </a:r>
+            <a:r>
+              <a:rPr lang="fr-FR" sz="2400" dirty="0">
+                <a:solidFill>
+                  <a:srgbClr val="0000FF"/>
+                </a:solidFill>
+                <a:latin typeface="Consolas" panose="020B0609020204030204" pitchFamily="49" charset="0"/>
+              </a:rPr>
+              <a:t>, google, site web, site internet, agence design paris, agence design, agence </a:t>
+            </a:r>
+            <a:r>
+              <a:rPr lang="fr-FR" sz="2400" dirty="0" err="1">
+                <a:solidFill>
+                  <a:srgbClr val="0000FF"/>
+                </a:solidFill>
+                <a:latin typeface="Consolas" panose="020B0609020204030204" pitchFamily="49" charset="0"/>
+              </a:rPr>
+              <a:t>design,agence</a:t>
+            </a:r>
+            <a:r>
+              <a:rPr lang="fr-FR" sz="2400" dirty="0">
+                <a:solidFill>
+                  <a:srgbClr val="0000FF"/>
+                </a:solidFill>
+                <a:latin typeface="Consolas" panose="020B0609020204030204" pitchFamily="49" charset="0"/>
+              </a:rPr>
+              <a:t> </a:t>
+            </a:r>
+            <a:r>
+              <a:rPr lang="fr-FR" sz="2400" dirty="0" err="1">
+                <a:solidFill>
+                  <a:srgbClr val="0000FF"/>
+                </a:solidFill>
+                <a:latin typeface="Consolas" panose="020B0609020204030204" pitchFamily="49" charset="0"/>
+              </a:rPr>
+              <a:t>design,agence</a:t>
+            </a:r>
+            <a:r>
+              <a:rPr lang="fr-FR" sz="2400" dirty="0">
+                <a:solidFill>
+                  <a:srgbClr val="0000FF"/>
+                </a:solidFill>
+                <a:latin typeface="Consolas" panose="020B0609020204030204" pitchFamily="49" charset="0"/>
+              </a:rPr>
+              <a:t> </a:t>
+            </a:r>
+            <a:r>
+              <a:rPr lang="fr-FR" sz="2400" dirty="0" err="1">
+                <a:solidFill>
+                  <a:srgbClr val="0000FF"/>
+                </a:solidFill>
+                <a:latin typeface="Consolas" panose="020B0609020204030204" pitchFamily="49" charset="0"/>
+              </a:rPr>
+              <a:t>design,agence</a:t>
+            </a:r>
+            <a:r>
+              <a:rPr lang="fr-FR" sz="2400" dirty="0">
+                <a:solidFill>
+                  <a:srgbClr val="0000FF"/>
+                </a:solidFill>
+                <a:latin typeface="Consolas" panose="020B0609020204030204" pitchFamily="49" charset="0"/>
+              </a:rPr>
+              <a:t> </a:t>
+            </a:r>
+            <a:r>
+              <a:rPr lang="fr-FR" sz="2400" dirty="0" err="1">
+                <a:solidFill>
+                  <a:srgbClr val="0000FF"/>
+                </a:solidFill>
+                <a:latin typeface="Consolas" panose="020B0609020204030204" pitchFamily="49" charset="0"/>
+              </a:rPr>
+              <a:t>design,agence</a:t>
+            </a:r>
+            <a:r>
+              <a:rPr lang="fr-FR" sz="2400" dirty="0">
+                <a:solidFill>
+                  <a:srgbClr val="0000FF"/>
+                </a:solidFill>
+                <a:latin typeface="Consolas" panose="020B0609020204030204" pitchFamily="49" charset="0"/>
+              </a:rPr>
+              <a:t> </a:t>
+            </a:r>
+            <a:r>
+              <a:rPr lang="fr-FR" sz="2400" dirty="0" err="1">
+                <a:solidFill>
+                  <a:srgbClr val="0000FF"/>
+                </a:solidFill>
+                <a:latin typeface="Consolas" panose="020B0609020204030204" pitchFamily="49" charset="0"/>
+              </a:rPr>
+              <a:t>design,agence</a:t>
+            </a:r>
+            <a:r>
+              <a:rPr lang="fr-FR" sz="2400" dirty="0">
+                <a:solidFill>
+                  <a:srgbClr val="0000FF"/>
+                </a:solidFill>
+                <a:latin typeface="Consolas" panose="020B0609020204030204" pitchFamily="49" charset="0"/>
+              </a:rPr>
+              <a:t> </a:t>
+            </a:r>
+            <a:r>
+              <a:rPr lang="fr-FR" sz="2400" dirty="0" err="1">
+                <a:solidFill>
+                  <a:srgbClr val="0000FF"/>
+                </a:solidFill>
+                <a:latin typeface="Consolas" panose="020B0609020204030204" pitchFamily="49" charset="0"/>
+              </a:rPr>
+              <a:t>design,agence</a:t>
+            </a:r>
+            <a:r>
+              <a:rPr lang="fr-FR" sz="2400" dirty="0">
+                <a:solidFill>
+                  <a:srgbClr val="0000FF"/>
+                </a:solidFill>
+                <a:latin typeface="Consolas" panose="020B0609020204030204" pitchFamily="49" charset="0"/>
+              </a:rPr>
+              <a:t> </a:t>
+            </a:r>
+            <a:r>
+              <a:rPr lang="fr-FR" sz="2400" dirty="0" err="1">
+                <a:solidFill>
+                  <a:srgbClr val="0000FF"/>
+                </a:solidFill>
+                <a:latin typeface="Consolas" panose="020B0609020204030204" pitchFamily="49" charset="0"/>
+              </a:rPr>
+              <a:t>design,agence</a:t>
+            </a:r>
+            <a:r>
+              <a:rPr lang="fr-FR" sz="2400" dirty="0">
+                <a:solidFill>
+                  <a:srgbClr val="0000FF"/>
+                </a:solidFill>
+                <a:latin typeface="Consolas" panose="020B0609020204030204" pitchFamily="49" charset="0"/>
+              </a:rPr>
+              <a:t> design"</a:t>
+            </a:r>
+            <a:r>
+              <a:rPr lang="fr-FR" sz="2400" dirty="0">
+                <a:solidFill>
+                  <a:srgbClr val="800000"/>
+                </a:solidFill>
+                <a:latin typeface="Consolas" panose="020B0609020204030204" pitchFamily="49" charset="0"/>
+              </a:rPr>
+              <a:t>&gt;</a:t>
             </a:r>
           </a:p>
           <a:p>
             <a:pPr lvl="1"/>
-            <a:r>
-              <a:rPr lang="fr-FR" sz="2800" dirty="0"/>
-              <a:t>Avant</a:t>
-            </a:r>
+            <a:endParaRPr lang="fr-FR" sz="2400" dirty="0">
+              <a:solidFill>
+                <a:srgbClr val="800000"/>
+              </a:solidFill>
+              <a:latin typeface="Consolas" panose="020B0609020204030204" pitchFamily="49" charset="0"/>
+            </a:endParaRPr>
+          </a:p>
+          <a:p>
+            <a:pPr marL="457200" lvl="1" indent="0">
+              <a:buNone/>
+            </a:pPr>
+            <a:r>
+              <a:rPr lang="fr-FR" sz="2400" dirty="0"/>
+              <a:t>Après : </a:t>
+            </a:r>
+            <a:r>
+              <a:rPr lang="fr-FR" sz="2400" dirty="0">
+                <a:solidFill>
+                  <a:srgbClr val="800000"/>
+                </a:solidFill>
+                <a:latin typeface="Consolas" panose="020B0609020204030204" pitchFamily="49" charset="0"/>
+              </a:rPr>
+              <a:t>&lt;</a:t>
+            </a:r>
+            <a:r>
+              <a:rPr lang="fr-FR" sz="2400" dirty="0" err="1">
+                <a:solidFill>
+                  <a:srgbClr val="800000"/>
+                </a:solidFill>
+                <a:latin typeface="Consolas" panose="020B0609020204030204" pitchFamily="49" charset="0"/>
+              </a:rPr>
+              <a:t>meta</a:t>
+            </a:r>
+            <a:r>
+              <a:rPr lang="fr-FR" sz="2400" dirty="0">
+                <a:solidFill>
+                  <a:srgbClr val="000000"/>
+                </a:solidFill>
+                <a:latin typeface="Consolas" panose="020B0609020204030204" pitchFamily="49" charset="0"/>
+              </a:rPr>
+              <a:t> </a:t>
+            </a:r>
+            <a:r>
+              <a:rPr lang="fr-FR" sz="2400" dirty="0" err="1">
+                <a:solidFill>
+                  <a:schemeClr val="bg2">
+                    <a:lumMod val="40000"/>
+                    <a:lumOff val="60000"/>
+                  </a:schemeClr>
+                </a:solidFill>
+                <a:latin typeface="Consolas" panose="020B0609020204030204" pitchFamily="49" charset="0"/>
+              </a:rPr>
+              <a:t>name</a:t>
+            </a:r>
+            <a:r>
+              <a:rPr lang="fr-FR" sz="2400" dirty="0">
+                <a:solidFill>
+                  <a:srgbClr val="000000"/>
+                </a:solidFill>
+                <a:latin typeface="Consolas" panose="020B0609020204030204" pitchFamily="49" charset="0"/>
+              </a:rPr>
+              <a:t>=</a:t>
+            </a:r>
+            <a:r>
+              <a:rPr lang="fr-FR" sz="2400" dirty="0">
+                <a:solidFill>
+                  <a:srgbClr val="0000FF"/>
+                </a:solidFill>
+                <a:latin typeface="Consolas" panose="020B0609020204030204" pitchFamily="49" charset="0"/>
+              </a:rPr>
+              <a:t>"keywords"</a:t>
+            </a:r>
+            <a:r>
+              <a:rPr lang="fr-FR" sz="2400" dirty="0">
+                <a:solidFill>
+                  <a:srgbClr val="000000"/>
+                </a:solidFill>
+                <a:latin typeface="Consolas" panose="020B0609020204030204" pitchFamily="49" charset="0"/>
+              </a:rPr>
+              <a:t> </a:t>
+            </a:r>
+            <a:r>
+              <a:rPr lang="fr-FR" sz="2400" dirty="0">
+                <a:solidFill>
+                  <a:schemeClr val="bg2">
+                    <a:lumMod val="40000"/>
+                    <a:lumOff val="60000"/>
+                  </a:schemeClr>
+                </a:solidFill>
+                <a:latin typeface="Consolas" panose="020B0609020204030204" pitchFamily="49" charset="0"/>
+              </a:rPr>
+              <a:t>content</a:t>
+            </a:r>
+            <a:r>
+              <a:rPr lang="fr-FR" sz="2400" dirty="0">
+                <a:solidFill>
+                  <a:srgbClr val="000000"/>
+                </a:solidFill>
+                <a:latin typeface="Consolas" panose="020B0609020204030204" pitchFamily="49" charset="0"/>
+              </a:rPr>
+              <a:t>=</a:t>
+            </a:r>
+            <a:r>
+              <a:rPr lang="fr-FR" sz="2400" dirty="0">
+                <a:solidFill>
+                  <a:srgbClr val="0000FF"/>
+                </a:solidFill>
+                <a:latin typeface="Consolas" panose="020B0609020204030204" pitchFamily="49" charset="0"/>
+              </a:rPr>
+              <a:t>"entreprise webdesign </a:t>
+            </a:r>
+            <a:r>
+              <a:rPr lang="fr-FR" sz="2400" dirty="0" err="1">
+                <a:solidFill>
+                  <a:srgbClr val="0000FF"/>
+                </a:solidFill>
+                <a:latin typeface="Consolas" panose="020B0609020204030204" pitchFamily="49" charset="0"/>
+              </a:rPr>
+              <a:t>Lyon,site</a:t>
+            </a:r>
+            <a:r>
+              <a:rPr lang="fr-FR" sz="2400" dirty="0">
+                <a:solidFill>
+                  <a:srgbClr val="0000FF"/>
+                </a:solidFill>
+                <a:latin typeface="Consolas" panose="020B0609020204030204" pitchFamily="49" charset="0"/>
+              </a:rPr>
+              <a:t> web, site internet, agence design"</a:t>
+            </a:r>
+            <a:r>
+              <a:rPr lang="fr-FR" sz="2400" dirty="0">
+                <a:solidFill>
+                  <a:srgbClr val="800000"/>
+                </a:solidFill>
+                <a:latin typeface="Consolas" panose="020B0609020204030204" pitchFamily="49" charset="0"/>
+              </a:rPr>
+              <a:t>&gt;</a:t>
+            </a:r>
+            <a:endParaRPr lang="fr-FR" sz="2400" dirty="0">
+              <a:solidFill>
+                <a:srgbClr val="000000"/>
+              </a:solidFill>
+              <a:latin typeface="Consolas" panose="020B0609020204030204" pitchFamily="49" charset="0"/>
+            </a:endParaRPr>
+          </a:p>
+          <a:p>
+            <a:pPr lvl="1"/>
+            <a:endParaRPr lang="fr-FR" sz="2400" dirty="0">
+              <a:solidFill>
+                <a:srgbClr val="000000"/>
+              </a:solidFill>
+              <a:latin typeface="Consolas" panose="020B0609020204030204" pitchFamily="49" charset="0"/>
+            </a:endParaRPr>
           </a:p>
           <a:p>
             <a:pPr lvl="1"/>
             <a:endParaRPr lang="fr-FR" sz="2800" dirty="0"/>
           </a:p>
-          <a:p>
-            <a:pPr lvl="1"/>
-            <a:endParaRPr lang="fr-FR" sz="2800" dirty="0"/>
-          </a:p>
-          <a:p>
-            <a:pPr lvl="1"/>
-            <a:r>
-              <a:rPr lang="fr-FR" sz="2800" dirty="0"/>
-              <a:t>Après</a:t>
-            </a:r>
-          </a:p>
-          <a:p>
-            <a:pPr marL="0" indent="0">
-              <a:buNone/>
-            </a:pPr>
-            <a:endParaRPr lang="fr-FR" sz="3200" dirty="0"/>
-          </a:p>
-        </p:txBody>
-      </p:sp>
-      <p:pic>
-        <p:nvPicPr>
-          <p:cNvPr id="7" name="Image 6">
-            <a:extLst>
-              <a:ext uri="{FF2B5EF4-FFF2-40B4-BE49-F238E27FC236}">
-                <a16:creationId xmlns:a16="http://schemas.microsoft.com/office/drawing/2014/main" id="{21F456E2-43EE-4633-8AAB-B89FF1FDA6EC}"/>
-              </a:ext>
-            </a:extLst>
-          </p:cNvPr>
-          <p:cNvPicPr>
-            <a:picLocks noChangeAspect="1"/>
-          </p:cNvPicPr>
-          <p:nvPr/>
-        </p:nvPicPr>
-        <p:blipFill>
-          <a:blip r:embed="rId2"/>
-          <a:stretch>
-            <a:fillRect/>
-          </a:stretch>
-        </p:blipFill>
-        <p:spPr>
-          <a:xfrm>
-            <a:off x="3031131" y="2905052"/>
-            <a:ext cx="8691547" cy="1216374"/>
-          </a:xfrm>
-          <a:prstGeom prst="rect">
-            <a:avLst/>
-          </a:prstGeom>
-        </p:spPr>
-      </p:pic>
-      <p:pic>
-        <p:nvPicPr>
-          <p:cNvPr id="13" name="Image 12">
-            <a:extLst>
-              <a:ext uri="{FF2B5EF4-FFF2-40B4-BE49-F238E27FC236}">
-                <a16:creationId xmlns:a16="http://schemas.microsoft.com/office/drawing/2014/main" id="{811B19F3-1BF3-4A4D-8E2F-10F23EEFB102}"/>
-              </a:ext>
-            </a:extLst>
-          </p:cNvPr>
-          <p:cNvPicPr>
-            <a:picLocks noChangeAspect="1"/>
-          </p:cNvPicPr>
-          <p:nvPr/>
-        </p:nvPicPr>
-        <p:blipFill>
-          <a:blip r:embed="rId3"/>
-          <a:stretch>
-            <a:fillRect/>
-          </a:stretch>
-        </p:blipFill>
-        <p:spPr>
-          <a:xfrm>
-            <a:off x="1237231" y="4689605"/>
-            <a:ext cx="10483342" cy="1749291"/>
-          </a:xfrm>
-          <a:prstGeom prst="rect">
-            <a:avLst/>
-          </a:prstGeom>
-        </p:spPr>
-      </p:pic>
+        </p:txBody>
+      </p:sp>
     </p:spTree>
     <p:extLst>
       <p:ext uri="{BB962C8B-B14F-4D97-AF65-F5344CB8AC3E}">
-        <p14:creationId xmlns:p14="http://schemas.microsoft.com/office/powerpoint/2010/main" val="1675634147"/>
+        <p14:creationId xmlns:p14="http://schemas.microsoft.com/office/powerpoint/2010/main" val="1091619205"/>
       </p:ext>
     </p:extLst>
   </p:cSld>
@@ -8657,7 +8580,7 @@
           <p:cNvPr id="2" name="Titre 1">
             <a:extLst>
               <a:ext uri="{FF2B5EF4-FFF2-40B4-BE49-F238E27FC236}">
-                <a16:creationId xmlns:a16="http://schemas.microsoft.com/office/drawing/2014/main" id="{8D13AE04-B191-4BE0-BAEE-1B807AA81759}"/>
+                <a16:creationId xmlns:a16="http://schemas.microsoft.com/office/drawing/2014/main" id="{F4AA0B26-5076-49E3-8639-FCC77EEC1B55}"/>
               </a:ext>
             </a:extLst>
           </p:cNvPr>
@@ -8675,26 +8598,80 @@
           <a:p>
             <a:r>
               <a:rPr lang="fr-FR" dirty="0"/>
-              <a:t>Comparaison Avant/Après</a:t>
-            </a:r>
+              <a:t>Optimiser les balises métas</a:t>
+            </a:r>
+          </a:p>
+        </p:txBody>
+      </p:sp>
+      <p:sp>
+        <p:nvSpPr>
+          <p:cNvPr id="3" name="Espace réservé du contenu 2">
+            <a:extLst>
+              <a:ext uri="{FF2B5EF4-FFF2-40B4-BE49-F238E27FC236}">
+                <a16:creationId xmlns:a16="http://schemas.microsoft.com/office/drawing/2014/main" id="{116F95D5-C73F-4018-B675-7B599D8F97AB}"/>
+              </a:ext>
+            </a:extLst>
+          </p:cNvPr>
+          <p:cNvSpPr>
+            <a:spLocks noGrp="1"/>
+          </p:cNvSpPr>
+          <p:nvPr>
+            <p:ph idx="1"/>
+          </p:nvPr>
+        </p:nvSpPr>
+        <p:spPr/>
+        <p:txBody>
+          <a:bodyPr>
+            <a:normAutofit/>
+          </a:bodyPr>
+          <a:lstStyle/>
+          <a:p>
+            <a:pPr lvl="1"/>
+            <a:r>
+              <a:rPr lang="fr-FR" sz="2800" dirty="0"/>
+              <a:t>Avant</a:t>
+            </a:r>
+          </a:p>
+          <a:p>
+            <a:pPr lvl="1"/>
+            <a:endParaRPr lang="fr-FR" sz="2800" dirty="0"/>
+          </a:p>
+          <a:p>
+            <a:pPr lvl="1"/>
+            <a:endParaRPr lang="fr-FR" sz="2800" dirty="0"/>
+          </a:p>
+          <a:p>
+            <a:pPr lvl="1"/>
+            <a:endParaRPr lang="fr-FR" sz="2800" dirty="0"/>
+          </a:p>
+          <a:p>
+            <a:pPr lvl="1"/>
+            <a:r>
+              <a:rPr lang="fr-FR" sz="2800" dirty="0"/>
+              <a:t>Après</a:t>
+            </a:r>
+          </a:p>
+          <a:p>
+            <a:pPr marL="0" indent="0">
+              <a:buNone/>
+            </a:pPr>
+            <a:endParaRPr lang="fr-FR" sz="3200" dirty="0"/>
           </a:p>
         </p:txBody>
       </p:sp>
       <p:pic>
         <p:nvPicPr>
-          <p:cNvPr id="5" name="Espace réservé du contenu 4">
+          <p:cNvPr id="7" name="Image 6">
             <a:extLst>
               <a:ext uri="{FF2B5EF4-FFF2-40B4-BE49-F238E27FC236}">
-                <a16:creationId xmlns:a16="http://schemas.microsoft.com/office/drawing/2014/main" id="{F83B43E0-0D27-4E28-826F-7806CE2DD73D}"/>
+                <a16:creationId xmlns:a16="http://schemas.microsoft.com/office/drawing/2014/main" id="{21F456E2-43EE-4633-8AAB-B89FF1FDA6EC}"/>
               </a:ext>
             </a:extLst>
           </p:cNvPr>
           <p:cNvPicPr>
-            <a:picLocks noGrp="1" noChangeAspect="1"/>
+            <a:picLocks noChangeAspect="1"/>
           </p:cNvPicPr>
-          <p:nvPr>
-            <p:ph idx="1"/>
-          </p:nvPr>
+          <p:nvPr/>
         </p:nvPicPr>
         <p:blipFill>
           <a:blip r:embed="rId2"/>
@@ -8704,15 +8681,48 @@
         </p:blipFill>
         <p:spPr>
           <a:xfrm>
-            <a:off x="427080" y="2014330"/>
-            <a:ext cx="11142068" cy="4544176"/>
-          </a:xfrm>
+            <a:off x="3031131" y="2905052"/>
+            <a:ext cx="8691547" cy="1216374"/>
+          </a:xfrm>
+          <a:prstGeom prst="rect">
+            <a:avLst/>
+          </a:prstGeom>
+        </p:spPr>
+      </p:pic>
+      <p:pic>
+        <p:nvPicPr>
+          <p:cNvPr id="13" name="Image 12">
+            <a:extLst>
+              <a:ext uri="{FF2B5EF4-FFF2-40B4-BE49-F238E27FC236}">
+                <a16:creationId xmlns:a16="http://schemas.microsoft.com/office/drawing/2014/main" id="{811B19F3-1BF3-4A4D-8E2F-10F23EEFB102}"/>
+              </a:ext>
+            </a:extLst>
+          </p:cNvPr>
+          <p:cNvPicPr>
+            <a:picLocks noChangeAspect="1"/>
+          </p:cNvPicPr>
+          <p:nvPr/>
+        </p:nvPicPr>
+        <p:blipFill>
+          <a:blip r:embed="rId3"/>
+          <a:stretch>
+            <a:fillRect/>
+          </a:stretch>
+        </p:blipFill>
+        <p:spPr>
+          <a:xfrm>
+            <a:off x="1237231" y="4689605"/>
+            <a:ext cx="10483342" cy="1749291"/>
+          </a:xfrm>
+          <a:prstGeom prst="rect">
+            <a:avLst/>
+          </a:prstGeom>
         </p:spPr>
       </p:pic>
     </p:spTree>
     <p:extLst>
       <p:ext uri="{BB962C8B-B14F-4D97-AF65-F5344CB8AC3E}">
-        <p14:creationId xmlns:p14="http://schemas.microsoft.com/office/powerpoint/2010/main" val="3477750291"/>
+        <p14:creationId xmlns:p14="http://schemas.microsoft.com/office/powerpoint/2010/main" val="1675634147"/>
       </p:ext>
     </p:extLst>
   </p:cSld>
@@ -8762,17 +8772,17 @@
           <a:p>
             <a:r>
               <a:rPr lang="fr-FR" dirty="0"/>
-              <a:t>Comparaison Avant/Après</a:t>
+              <a:t>Optimiser les balises métas</a:t>
             </a:r>
           </a:p>
         </p:txBody>
       </p:sp>
       <p:pic>
         <p:nvPicPr>
-          <p:cNvPr id="7" name="Espace réservé du contenu 6">
+          <p:cNvPr id="5" name="Espace réservé du contenu 4">
             <a:extLst>
               <a:ext uri="{FF2B5EF4-FFF2-40B4-BE49-F238E27FC236}">
-                <a16:creationId xmlns:a16="http://schemas.microsoft.com/office/drawing/2014/main" id="{1045E29E-9D98-487E-A1A0-1C659BC0E900}"/>
+                <a16:creationId xmlns:a16="http://schemas.microsoft.com/office/drawing/2014/main" id="{F83B43E0-0D27-4E28-826F-7806CE2DD73D}"/>
               </a:ext>
             </a:extLst>
           </p:cNvPr>
@@ -8791,15 +8801,15 @@
         </p:blipFill>
         <p:spPr>
           <a:xfrm>
-            <a:off x="271352" y="2080592"/>
-            <a:ext cx="11470073" cy="4519838"/>
+            <a:off x="427080" y="2014330"/>
+            <a:ext cx="11142068" cy="4544176"/>
           </a:xfrm>
         </p:spPr>
       </p:pic>
     </p:spTree>
     <p:extLst>
       <p:ext uri="{BB962C8B-B14F-4D97-AF65-F5344CB8AC3E}">
-        <p14:creationId xmlns:p14="http://schemas.microsoft.com/office/powerpoint/2010/main" val="241411229"/>
+        <p14:creationId xmlns:p14="http://schemas.microsoft.com/office/powerpoint/2010/main" val="3477750291"/>
       </p:ext>
     </p:extLst>
   </p:cSld>
@@ -8831,7 +8841,7 @@
           <p:cNvPr id="2" name="Titre 1">
             <a:extLst>
               <a:ext uri="{FF2B5EF4-FFF2-40B4-BE49-F238E27FC236}">
-                <a16:creationId xmlns:a16="http://schemas.microsoft.com/office/drawing/2014/main" id="{210F176C-2127-438D-B495-162CE17844B1}"/>
+                <a16:creationId xmlns:a16="http://schemas.microsoft.com/office/drawing/2014/main" id="{8D13AE04-B191-4BE0-BAEE-1B807AA81759}"/>
               </a:ext>
             </a:extLst>
           </p:cNvPr>
@@ -8849,7 +8859,94 @@
           <a:p>
             <a:r>
               <a:rPr lang="fr-FR" dirty="0"/>
-              <a:t>Comparaison Avant-Après</a:t>
+              <a:t>Optimiser les balises métas</a:t>
+            </a:r>
+          </a:p>
+        </p:txBody>
+      </p:sp>
+      <p:pic>
+        <p:nvPicPr>
+          <p:cNvPr id="7" name="Espace réservé du contenu 6">
+            <a:extLst>
+              <a:ext uri="{FF2B5EF4-FFF2-40B4-BE49-F238E27FC236}">
+                <a16:creationId xmlns:a16="http://schemas.microsoft.com/office/drawing/2014/main" id="{1045E29E-9D98-487E-A1A0-1C659BC0E900}"/>
+              </a:ext>
+            </a:extLst>
+          </p:cNvPr>
+          <p:cNvPicPr>
+            <a:picLocks noGrp="1" noChangeAspect="1"/>
+          </p:cNvPicPr>
+          <p:nvPr>
+            <p:ph idx="1"/>
+          </p:nvPr>
+        </p:nvPicPr>
+        <p:blipFill>
+          <a:blip r:embed="rId2"/>
+          <a:stretch>
+            <a:fillRect/>
+          </a:stretch>
+        </p:blipFill>
+        <p:spPr>
+          <a:xfrm>
+            <a:off x="271352" y="2080592"/>
+            <a:ext cx="11470073" cy="4519838"/>
+          </a:xfrm>
+        </p:spPr>
+      </p:pic>
+    </p:spTree>
+    <p:extLst>
+      <p:ext uri="{BB962C8B-B14F-4D97-AF65-F5344CB8AC3E}">
+        <p14:creationId xmlns:p14="http://schemas.microsoft.com/office/powerpoint/2010/main" val="241411229"/>
+      </p:ext>
+    </p:extLst>
+  </p:cSld>
+  <p:clrMapOvr>
+    <a:masterClrMapping/>
+  </p:clrMapOvr>
+</p:sld>
+</file>
+
+<file path=ppt/slides/slide17.xml><?xml version="1.0" encoding="utf-8"?>
+<p:sld xmlns:a="http://schemas.openxmlformats.org/drawingml/2006/main" xmlns:r="http://schemas.openxmlformats.org/officeDocument/2006/relationships" xmlns:p="http://schemas.openxmlformats.org/presentationml/2006/main">
+  <p:cSld>
+    <p:spTree>
+      <p:nvGrpSpPr>
+        <p:cNvPr id="1" name=""/>
+        <p:cNvGrpSpPr/>
+        <p:nvPr/>
+      </p:nvGrpSpPr>
+      <p:grpSpPr>
+        <a:xfrm>
+          <a:off x="0" y="0"/>
+          <a:ext cx="0" cy="0"/>
+          <a:chOff x="0" y="0"/>
+          <a:chExt cx="0" cy="0"/>
+        </a:xfrm>
+      </p:grpSpPr>
+      <p:sp>
+        <p:nvSpPr>
+          <p:cNvPr id="2" name="Titre 1">
+            <a:extLst>
+              <a:ext uri="{FF2B5EF4-FFF2-40B4-BE49-F238E27FC236}">
+                <a16:creationId xmlns:a16="http://schemas.microsoft.com/office/drawing/2014/main" id="{AFC58229-C546-426E-A463-0EEAA22FFB3A}"/>
+              </a:ext>
+            </a:extLst>
+          </p:cNvPr>
+          <p:cNvSpPr>
+            <a:spLocks noGrp="1"/>
+          </p:cNvSpPr>
+          <p:nvPr>
+            <p:ph type="title"/>
+          </p:nvPr>
+        </p:nvSpPr>
+        <p:spPr/>
+        <p:txBody>
+          <a:bodyPr/>
+          <a:lstStyle/>
+          <a:p>
+            <a:r>
+              <a:rPr lang="fr-FR" dirty="0"/>
+              <a:t>Travailler les titres et textes pour intégrer les mots clés</a:t>
             </a:r>
           </a:p>
         </p:txBody>
@@ -8859,7 +8956,7 @@
           <p:cNvPr id="3" name="Espace réservé du contenu 2">
             <a:extLst>
               <a:ext uri="{FF2B5EF4-FFF2-40B4-BE49-F238E27FC236}">
-                <a16:creationId xmlns:a16="http://schemas.microsoft.com/office/drawing/2014/main" id="{AD16BD5A-FF7B-4B13-92BD-287100FFF5B8}"/>
+                <a16:creationId xmlns:a16="http://schemas.microsoft.com/office/drawing/2014/main" id="{E9C00846-503A-4C53-A35F-56BA68F5D3CF}"/>
               </a:ext>
             </a:extLst>
           </p:cNvPr>
@@ -8877,46 +8974,10 @@
           <a:p>
             <a:r>
               <a:rPr lang="fr-FR" dirty="0"/>
-              <a:t>Améliorer l’accessibilité du site sur la langue</a:t>
-            </a:r>
-          </a:p>
-          <a:p>
-            <a:endParaRPr lang="fr-FR" dirty="0"/>
-          </a:p>
-          <a:p>
-            <a:pPr lvl="1"/>
-            <a:r>
-              <a:rPr lang="fr-FR" dirty="0"/>
-              <a:t>Avant</a:t>
-            </a:r>
-          </a:p>
-          <a:p>
-            <a:pPr lvl="1"/>
-            <a:endParaRPr lang="fr-FR" dirty="0"/>
-          </a:p>
-          <a:p>
-            <a:pPr lvl="1"/>
-            <a:endParaRPr lang="fr-FR" dirty="0"/>
-          </a:p>
-          <a:p>
-            <a:pPr lvl="1"/>
-            <a:endParaRPr lang="fr-FR" dirty="0"/>
-          </a:p>
-          <a:p>
-            <a:pPr lvl="1"/>
-            <a:r>
-              <a:rPr lang="fr-FR" dirty="0"/>
-              <a:t>Après</a:t>
-            </a:r>
-          </a:p>
-          <a:p>
-            <a:pPr lvl="1"/>
-            <a:endParaRPr lang="fr-FR" dirty="0"/>
-          </a:p>
-          <a:p>
-            <a:pPr marL="457200" lvl="1" indent="0">
-              <a:buNone/>
-            </a:pPr>
+              <a:t>Avant </a:t>
+            </a:r>
+          </a:p>
+          <a:p>
             <a:endParaRPr lang="fr-FR" dirty="0"/>
           </a:p>
         </p:txBody>
@@ -8926,7 +8987,7 @@
           <p:cNvPr id="5" name="Image 4">
             <a:extLst>
               <a:ext uri="{FF2B5EF4-FFF2-40B4-BE49-F238E27FC236}">
-                <a16:creationId xmlns:a16="http://schemas.microsoft.com/office/drawing/2014/main" id="{295EA66A-C411-437F-AB9B-75A363EEB070}"/>
+                <a16:creationId xmlns:a16="http://schemas.microsoft.com/office/drawing/2014/main" id="{D5880726-9022-437D-99E9-E7325B6F755B}"/>
               </a:ext>
             </a:extLst>
           </p:cNvPr>
@@ -8943,20 +9004,118 @@
         </p:blipFill>
         <p:spPr>
           <a:xfrm>
-            <a:off x="2902226" y="3518452"/>
-            <a:ext cx="3635563" cy="426519"/>
+            <a:off x="2426479" y="2513813"/>
+            <a:ext cx="7339042" cy="4098238"/>
           </a:xfrm>
           <a:prstGeom prst="rect">
             <a:avLst/>
           </a:prstGeom>
         </p:spPr>
       </p:pic>
+    </p:spTree>
+    <p:extLst>
+      <p:ext uri="{BB962C8B-B14F-4D97-AF65-F5344CB8AC3E}">
+        <p14:creationId xmlns:p14="http://schemas.microsoft.com/office/powerpoint/2010/main" val="4056659214"/>
+      </p:ext>
+    </p:extLst>
+  </p:cSld>
+  <p:clrMapOvr>
+    <a:masterClrMapping/>
+  </p:clrMapOvr>
+</p:sld>
+</file>
+
+<file path=ppt/slides/slide18.xml><?xml version="1.0" encoding="utf-8"?>
+<p:sld xmlns:a="http://schemas.openxmlformats.org/drawingml/2006/main" xmlns:r="http://schemas.openxmlformats.org/officeDocument/2006/relationships" xmlns:p="http://schemas.openxmlformats.org/presentationml/2006/main">
+  <p:cSld>
+    <p:spTree>
+      <p:nvGrpSpPr>
+        <p:cNvPr id="1" name=""/>
+        <p:cNvGrpSpPr/>
+        <p:nvPr/>
+      </p:nvGrpSpPr>
+      <p:grpSpPr>
+        <a:xfrm>
+          <a:off x="0" y="0"/>
+          <a:ext cx="0" cy="0"/>
+          <a:chOff x="0" y="0"/>
+          <a:chExt cx="0" cy="0"/>
+        </a:xfrm>
+      </p:grpSpPr>
+      <p:sp>
+        <p:nvSpPr>
+          <p:cNvPr id="2" name="Titre 1">
+            <a:extLst>
+              <a:ext uri="{FF2B5EF4-FFF2-40B4-BE49-F238E27FC236}">
+                <a16:creationId xmlns:a16="http://schemas.microsoft.com/office/drawing/2014/main" id="{AFC58229-C546-426E-A463-0EEAA22FFB3A}"/>
+              </a:ext>
+            </a:extLst>
+          </p:cNvPr>
+          <p:cNvSpPr>
+            <a:spLocks noGrp="1"/>
+          </p:cNvSpPr>
+          <p:nvPr>
+            <p:ph type="title"/>
+          </p:nvPr>
+        </p:nvSpPr>
+        <p:spPr/>
+        <p:txBody>
+          <a:bodyPr/>
+          <a:lstStyle/>
+          <a:p>
+            <a:r>
+              <a:rPr lang="fr-FR" dirty="0"/>
+              <a:t>Travailler les titres et textes pour intégrer les mots clés</a:t>
+            </a:r>
+          </a:p>
+        </p:txBody>
+      </p:sp>
+      <p:sp>
+        <p:nvSpPr>
+          <p:cNvPr id="3" name="Espace réservé du contenu 2">
+            <a:extLst>
+              <a:ext uri="{FF2B5EF4-FFF2-40B4-BE49-F238E27FC236}">
+                <a16:creationId xmlns:a16="http://schemas.microsoft.com/office/drawing/2014/main" id="{E9C00846-503A-4C53-A35F-56BA68F5D3CF}"/>
+              </a:ext>
+            </a:extLst>
+          </p:cNvPr>
+          <p:cNvSpPr>
+            <a:spLocks noGrp="1"/>
+          </p:cNvSpPr>
+          <p:nvPr>
+            <p:ph idx="1"/>
+          </p:nvPr>
+        </p:nvSpPr>
+        <p:spPr/>
+        <p:txBody>
+          <a:bodyPr/>
+          <a:lstStyle/>
+          <a:p>
+            <a:r>
+              <a:rPr lang="fr-FR" dirty="0"/>
+              <a:t>Après</a:t>
+            </a:r>
+          </a:p>
+          <a:p>
+            <a:pPr marL="0" indent="0">
+              <a:buNone/>
+            </a:pPr>
+            <a:r>
+              <a:rPr lang="fr-FR" dirty="0"/>
+              <a:t> </a:t>
+            </a:r>
+          </a:p>
+          <a:p>
+            <a:endParaRPr lang="fr-FR" dirty="0"/>
+          </a:p>
+        </p:txBody>
+      </p:sp>
       <p:pic>
         <p:nvPicPr>
-          <p:cNvPr id="7" name="Image 6">
+          <p:cNvPr id="6" name="Image 5">
             <a:extLst>
               <a:ext uri="{FF2B5EF4-FFF2-40B4-BE49-F238E27FC236}">
-                <a16:creationId xmlns:a16="http://schemas.microsoft.com/office/drawing/2014/main" id="{AFF4A6DB-76DB-4B60-9279-C06A2D740F3D}"/>
+                <a16:creationId xmlns:a16="http://schemas.microsoft.com/office/drawing/2014/main" id="{AD14218F-3D77-497A-A6A3-38F4B87948BF}"/>
               </a:ext>
             </a:extLst>
           </p:cNvPr>
@@ -8966,15 +9125,15 @@
           <p:nvPr/>
         </p:nvPicPr>
         <p:blipFill>
-          <a:blip r:embed="rId3"/>
+          <a:blip r:embed="rId2"/>
           <a:stretch>
             <a:fillRect/>
           </a:stretch>
         </p:blipFill>
         <p:spPr>
           <a:xfrm>
-            <a:off x="2902226" y="4881348"/>
-            <a:ext cx="3397444" cy="562168"/>
+            <a:off x="2544418" y="2260428"/>
+            <a:ext cx="7919192" cy="4178468"/>
           </a:xfrm>
           <a:prstGeom prst="rect">
             <a:avLst/>
@@ -8984,7 +9143,135 @@
     </p:spTree>
     <p:extLst>
       <p:ext uri="{BB962C8B-B14F-4D97-AF65-F5344CB8AC3E}">
-        <p14:creationId xmlns:p14="http://schemas.microsoft.com/office/powerpoint/2010/main" val="2762365754"/>
+        <p14:creationId xmlns:p14="http://schemas.microsoft.com/office/powerpoint/2010/main" val="711583088"/>
+      </p:ext>
+    </p:extLst>
+  </p:cSld>
+  <p:clrMapOvr>
+    <a:masterClrMapping/>
+  </p:clrMapOvr>
+</p:sld>
+</file>
+
+<file path=ppt/slides/slide19.xml><?xml version="1.0" encoding="utf-8"?>
+<p:sld xmlns:a="http://schemas.openxmlformats.org/drawingml/2006/main" xmlns:r="http://schemas.openxmlformats.org/officeDocument/2006/relationships" xmlns:p="http://schemas.openxmlformats.org/presentationml/2006/main">
+  <p:cSld>
+    <p:spTree>
+      <p:nvGrpSpPr>
+        <p:cNvPr id="1" name=""/>
+        <p:cNvGrpSpPr/>
+        <p:nvPr/>
+      </p:nvGrpSpPr>
+      <p:grpSpPr>
+        <a:xfrm>
+          <a:off x="0" y="0"/>
+          <a:ext cx="0" cy="0"/>
+          <a:chOff x="0" y="0"/>
+          <a:chExt cx="0" cy="0"/>
+        </a:xfrm>
+      </p:grpSpPr>
+      <p:sp>
+        <p:nvSpPr>
+          <p:cNvPr id="2" name="Titre 1">
+            <a:extLst>
+              <a:ext uri="{FF2B5EF4-FFF2-40B4-BE49-F238E27FC236}">
+                <a16:creationId xmlns:a16="http://schemas.microsoft.com/office/drawing/2014/main" id="{AFC58229-C546-426E-A463-0EEAA22FFB3A}"/>
+              </a:ext>
+            </a:extLst>
+          </p:cNvPr>
+          <p:cNvSpPr>
+            <a:spLocks noGrp="1"/>
+          </p:cNvSpPr>
+          <p:nvPr>
+            <p:ph type="title"/>
+          </p:nvPr>
+        </p:nvSpPr>
+        <p:spPr/>
+        <p:txBody>
+          <a:bodyPr/>
+          <a:lstStyle/>
+          <a:p>
+            <a:r>
+              <a:rPr lang="fr-FR" dirty="0"/>
+              <a:t>Travailler les titres et textes pour intégrer les mots clés</a:t>
+            </a:r>
+          </a:p>
+        </p:txBody>
+      </p:sp>
+      <p:sp>
+        <p:nvSpPr>
+          <p:cNvPr id="3" name="Espace réservé du contenu 2">
+            <a:extLst>
+              <a:ext uri="{FF2B5EF4-FFF2-40B4-BE49-F238E27FC236}">
+                <a16:creationId xmlns:a16="http://schemas.microsoft.com/office/drawing/2014/main" id="{E9C00846-503A-4C53-A35F-56BA68F5D3CF}"/>
+              </a:ext>
+            </a:extLst>
+          </p:cNvPr>
+          <p:cNvSpPr>
+            <a:spLocks noGrp="1"/>
+          </p:cNvSpPr>
+          <p:nvPr>
+            <p:ph idx="1"/>
+          </p:nvPr>
+        </p:nvSpPr>
+        <p:spPr/>
+        <p:txBody>
+          <a:bodyPr/>
+          <a:lstStyle/>
+          <a:p>
+            <a:r>
+              <a:rPr lang="fr-FR" dirty="0"/>
+              <a:t>Avant</a:t>
+            </a:r>
+          </a:p>
+          <a:p>
+            <a:pPr marL="0" indent="0">
+              <a:buNone/>
+            </a:pPr>
+            <a:r>
+              <a:rPr lang="fr-FR" dirty="0"/>
+              <a:t> </a:t>
+            </a:r>
+          </a:p>
+          <a:p>
+            <a:endParaRPr lang="fr-FR" dirty="0"/>
+          </a:p>
+        </p:txBody>
+      </p:sp>
+      <p:pic>
+        <p:nvPicPr>
+          <p:cNvPr id="10" name="Image 9">
+            <a:extLst>
+              <a:ext uri="{FF2B5EF4-FFF2-40B4-BE49-F238E27FC236}">
+                <a16:creationId xmlns:a16="http://schemas.microsoft.com/office/drawing/2014/main" id="{9071352D-3E5E-4420-8A3E-BEA9A20F1EF1}"/>
+              </a:ext>
+            </a:extLst>
+          </p:cNvPr>
+          <p:cNvPicPr>
+            <a:picLocks noChangeAspect="1"/>
+          </p:cNvPicPr>
+          <p:nvPr/>
+        </p:nvPicPr>
+        <p:blipFill>
+          <a:blip r:embed="rId2"/>
+          <a:stretch>
+            <a:fillRect/>
+          </a:stretch>
+        </p:blipFill>
+        <p:spPr>
+          <a:xfrm>
+            <a:off x="2708267" y="2561680"/>
+            <a:ext cx="8021169" cy="3877216"/>
+          </a:xfrm>
+          <a:prstGeom prst="rect">
+            <a:avLst/>
+          </a:prstGeom>
+        </p:spPr>
+      </p:pic>
+    </p:spTree>
+    <p:extLst>
+      <p:ext uri="{BB962C8B-B14F-4D97-AF65-F5344CB8AC3E}">
+        <p14:creationId xmlns:p14="http://schemas.microsoft.com/office/powerpoint/2010/main" val="2841149150"/>
       </p:ext>
     </p:extLst>
   </p:cSld>
@@ -9114,6 +9401,1033 @@
     <p:extLst>
       <p:ext uri="{BB962C8B-B14F-4D97-AF65-F5344CB8AC3E}">
         <p14:creationId xmlns:p14="http://schemas.microsoft.com/office/powerpoint/2010/main" val="3206132639"/>
+      </p:ext>
+    </p:extLst>
+  </p:cSld>
+  <p:clrMapOvr>
+    <a:masterClrMapping/>
+  </p:clrMapOvr>
+</p:sld>
+</file>
+
+<file path=ppt/slides/slide20.xml><?xml version="1.0" encoding="utf-8"?>
+<p:sld xmlns:a="http://schemas.openxmlformats.org/drawingml/2006/main" xmlns:r="http://schemas.openxmlformats.org/officeDocument/2006/relationships" xmlns:p="http://schemas.openxmlformats.org/presentationml/2006/main">
+  <p:cSld>
+    <p:spTree>
+      <p:nvGrpSpPr>
+        <p:cNvPr id="1" name=""/>
+        <p:cNvGrpSpPr/>
+        <p:nvPr/>
+      </p:nvGrpSpPr>
+      <p:grpSpPr>
+        <a:xfrm>
+          <a:off x="0" y="0"/>
+          <a:ext cx="0" cy="0"/>
+          <a:chOff x="0" y="0"/>
+          <a:chExt cx="0" cy="0"/>
+        </a:xfrm>
+      </p:grpSpPr>
+      <p:sp>
+        <p:nvSpPr>
+          <p:cNvPr id="2" name="Titre 1">
+            <a:extLst>
+              <a:ext uri="{FF2B5EF4-FFF2-40B4-BE49-F238E27FC236}">
+                <a16:creationId xmlns:a16="http://schemas.microsoft.com/office/drawing/2014/main" id="{AFC58229-C546-426E-A463-0EEAA22FFB3A}"/>
+              </a:ext>
+            </a:extLst>
+          </p:cNvPr>
+          <p:cNvSpPr>
+            <a:spLocks noGrp="1"/>
+          </p:cNvSpPr>
+          <p:nvPr>
+            <p:ph type="title"/>
+          </p:nvPr>
+        </p:nvSpPr>
+        <p:spPr/>
+        <p:txBody>
+          <a:bodyPr/>
+          <a:lstStyle/>
+          <a:p>
+            <a:r>
+              <a:rPr lang="fr-FR" dirty="0"/>
+              <a:t>Travailler les titres et textes pour intégrer les mots clés</a:t>
+            </a:r>
+          </a:p>
+        </p:txBody>
+      </p:sp>
+      <p:sp>
+        <p:nvSpPr>
+          <p:cNvPr id="3" name="Espace réservé du contenu 2">
+            <a:extLst>
+              <a:ext uri="{FF2B5EF4-FFF2-40B4-BE49-F238E27FC236}">
+                <a16:creationId xmlns:a16="http://schemas.microsoft.com/office/drawing/2014/main" id="{E9C00846-503A-4C53-A35F-56BA68F5D3CF}"/>
+              </a:ext>
+            </a:extLst>
+          </p:cNvPr>
+          <p:cNvSpPr>
+            <a:spLocks noGrp="1"/>
+          </p:cNvSpPr>
+          <p:nvPr>
+            <p:ph idx="1"/>
+          </p:nvPr>
+        </p:nvSpPr>
+        <p:spPr/>
+        <p:txBody>
+          <a:bodyPr/>
+          <a:lstStyle/>
+          <a:p>
+            <a:r>
+              <a:rPr lang="fr-FR" dirty="0"/>
+              <a:t>Après </a:t>
+            </a:r>
+          </a:p>
+          <a:p>
+            <a:endParaRPr lang="fr-FR" dirty="0"/>
+          </a:p>
+        </p:txBody>
+      </p:sp>
+      <p:pic>
+        <p:nvPicPr>
+          <p:cNvPr id="6" name="Image 5">
+            <a:extLst>
+              <a:ext uri="{FF2B5EF4-FFF2-40B4-BE49-F238E27FC236}">
+                <a16:creationId xmlns:a16="http://schemas.microsoft.com/office/drawing/2014/main" id="{378E67F8-E116-4D20-A2AB-95C7B4B13729}"/>
+              </a:ext>
+            </a:extLst>
+          </p:cNvPr>
+          <p:cNvPicPr>
+            <a:picLocks noChangeAspect="1"/>
+          </p:cNvPicPr>
+          <p:nvPr/>
+        </p:nvPicPr>
+        <p:blipFill>
+          <a:blip r:embed="rId2"/>
+          <a:stretch>
+            <a:fillRect/>
+          </a:stretch>
+        </p:blipFill>
+        <p:spPr>
+          <a:xfrm>
+            <a:off x="1897818" y="2336873"/>
+            <a:ext cx="10183646" cy="3896269"/>
+          </a:xfrm>
+          <a:prstGeom prst="rect">
+            <a:avLst/>
+          </a:prstGeom>
+        </p:spPr>
+      </p:pic>
+    </p:spTree>
+    <p:extLst>
+      <p:ext uri="{BB962C8B-B14F-4D97-AF65-F5344CB8AC3E}">
+        <p14:creationId xmlns:p14="http://schemas.microsoft.com/office/powerpoint/2010/main" val="1357402531"/>
+      </p:ext>
+    </p:extLst>
+  </p:cSld>
+  <p:clrMapOvr>
+    <a:masterClrMapping/>
+  </p:clrMapOvr>
+</p:sld>
+</file>
+
+<file path=ppt/slides/slide21.xml><?xml version="1.0" encoding="utf-8"?>
+<p:sld xmlns:a="http://schemas.openxmlformats.org/drawingml/2006/main" xmlns:r="http://schemas.openxmlformats.org/officeDocument/2006/relationships" xmlns:p="http://schemas.openxmlformats.org/presentationml/2006/main">
+  <p:cSld>
+    <p:spTree>
+      <p:nvGrpSpPr>
+        <p:cNvPr id="1" name=""/>
+        <p:cNvGrpSpPr/>
+        <p:nvPr/>
+      </p:nvGrpSpPr>
+      <p:grpSpPr>
+        <a:xfrm>
+          <a:off x="0" y="0"/>
+          <a:ext cx="0" cy="0"/>
+          <a:chOff x="0" y="0"/>
+          <a:chExt cx="0" cy="0"/>
+        </a:xfrm>
+      </p:grpSpPr>
+      <p:sp>
+        <p:nvSpPr>
+          <p:cNvPr id="2" name="Titre 1">
+            <a:extLst>
+              <a:ext uri="{FF2B5EF4-FFF2-40B4-BE49-F238E27FC236}">
+                <a16:creationId xmlns:a16="http://schemas.microsoft.com/office/drawing/2014/main" id="{36FB27C4-D2B6-4A1A-AAB1-10DA2FB95F9F}"/>
+              </a:ext>
+            </a:extLst>
+          </p:cNvPr>
+          <p:cNvSpPr>
+            <a:spLocks noGrp="1"/>
+          </p:cNvSpPr>
+          <p:nvPr>
+            <p:ph type="title"/>
+          </p:nvPr>
+        </p:nvSpPr>
+        <p:spPr/>
+        <p:txBody>
+          <a:bodyPr/>
+          <a:lstStyle/>
+          <a:p>
+            <a:r>
+              <a:rPr lang="fr-FR" dirty="0"/>
+              <a:t>Structurer notre page de code HTML</a:t>
+            </a:r>
+          </a:p>
+        </p:txBody>
+      </p:sp>
+      <p:pic>
+        <p:nvPicPr>
+          <p:cNvPr id="5" name="Espace réservé du contenu 4">
+            <a:extLst>
+              <a:ext uri="{FF2B5EF4-FFF2-40B4-BE49-F238E27FC236}">
+                <a16:creationId xmlns:a16="http://schemas.microsoft.com/office/drawing/2014/main" id="{197CD78D-A750-41B0-8D59-07E660208920}"/>
+              </a:ext>
+            </a:extLst>
+          </p:cNvPr>
+          <p:cNvPicPr>
+            <a:picLocks noGrp="1" noChangeAspect="1"/>
+          </p:cNvPicPr>
+          <p:nvPr>
+            <p:ph idx="1"/>
+          </p:nvPr>
+        </p:nvPicPr>
+        <p:blipFill>
+          <a:blip r:embed="rId2"/>
+          <a:stretch>
+            <a:fillRect/>
+          </a:stretch>
+        </p:blipFill>
+        <p:spPr>
+          <a:xfrm>
+            <a:off x="1395937" y="2120121"/>
+            <a:ext cx="8304653" cy="4509875"/>
+          </a:xfrm>
+        </p:spPr>
+      </p:pic>
+    </p:spTree>
+    <p:extLst>
+      <p:ext uri="{BB962C8B-B14F-4D97-AF65-F5344CB8AC3E}">
+        <p14:creationId xmlns:p14="http://schemas.microsoft.com/office/powerpoint/2010/main" val="751111364"/>
+      </p:ext>
+    </p:extLst>
+  </p:cSld>
+  <p:clrMapOvr>
+    <a:masterClrMapping/>
+  </p:clrMapOvr>
+</p:sld>
+</file>
+
+<file path=ppt/slides/slide22.xml><?xml version="1.0" encoding="utf-8"?>
+<p:sld xmlns:a="http://schemas.openxmlformats.org/drawingml/2006/main" xmlns:r="http://schemas.openxmlformats.org/officeDocument/2006/relationships" xmlns:p="http://schemas.openxmlformats.org/presentationml/2006/main">
+  <p:cSld>
+    <p:spTree>
+      <p:nvGrpSpPr>
+        <p:cNvPr id="1" name=""/>
+        <p:cNvGrpSpPr/>
+        <p:nvPr/>
+      </p:nvGrpSpPr>
+      <p:grpSpPr>
+        <a:xfrm>
+          <a:off x="0" y="0"/>
+          <a:ext cx="0" cy="0"/>
+          <a:chOff x="0" y="0"/>
+          <a:chExt cx="0" cy="0"/>
+        </a:xfrm>
+      </p:grpSpPr>
+      <p:sp>
+        <p:nvSpPr>
+          <p:cNvPr id="2" name="Titre 1">
+            <a:extLst>
+              <a:ext uri="{FF2B5EF4-FFF2-40B4-BE49-F238E27FC236}">
+                <a16:creationId xmlns:a16="http://schemas.microsoft.com/office/drawing/2014/main" id="{7F8D075F-CA69-433A-B864-FE75DE909F16}"/>
+              </a:ext>
+            </a:extLst>
+          </p:cNvPr>
+          <p:cNvSpPr>
+            <a:spLocks noGrp="1"/>
+          </p:cNvSpPr>
+          <p:nvPr>
+            <p:ph type="title"/>
+          </p:nvPr>
+        </p:nvSpPr>
+        <p:spPr/>
+        <p:txBody>
+          <a:bodyPr/>
+          <a:lstStyle/>
+          <a:p>
+            <a:r>
+              <a:rPr lang="fr-FR" dirty="0"/>
+              <a:t>Adapter le site en mobile-first</a:t>
+            </a:r>
+          </a:p>
+        </p:txBody>
+      </p:sp>
+      <p:pic>
+        <p:nvPicPr>
+          <p:cNvPr id="5" name="Espace réservé du contenu 4">
+            <a:extLst>
+              <a:ext uri="{FF2B5EF4-FFF2-40B4-BE49-F238E27FC236}">
+                <a16:creationId xmlns:a16="http://schemas.microsoft.com/office/drawing/2014/main" id="{86DEA407-5A31-4121-B747-8F8A398D0E52}"/>
+              </a:ext>
+            </a:extLst>
+          </p:cNvPr>
+          <p:cNvPicPr>
+            <a:picLocks noGrp="1" noChangeAspect="1"/>
+          </p:cNvPicPr>
+          <p:nvPr>
+            <p:ph idx="1"/>
+          </p:nvPr>
+        </p:nvPicPr>
+        <p:blipFill>
+          <a:blip r:embed="rId2"/>
+          <a:stretch>
+            <a:fillRect/>
+          </a:stretch>
+        </p:blipFill>
+        <p:spPr>
+          <a:xfrm>
+            <a:off x="2065611" y="2505909"/>
+            <a:ext cx="4061823" cy="3598863"/>
+          </a:xfrm>
+        </p:spPr>
+      </p:pic>
+      <p:pic>
+        <p:nvPicPr>
+          <p:cNvPr id="7" name="Image 6">
+            <a:extLst>
+              <a:ext uri="{FF2B5EF4-FFF2-40B4-BE49-F238E27FC236}">
+                <a16:creationId xmlns:a16="http://schemas.microsoft.com/office/drawing/2014/main" id="{EC5FC238-9C39-4018-890B-72C59698D761}"/>
+              </a:ext>
+            </a:extLst>
+          </p:cNvPr>
+          <p:cNvPicPr>
+            <a:picLocks noChangeAspect="1"/>
+          </p:cNvPicPr>
+          <p:nvPr/>
+        </p:nvPicPr>
+        <p:blipFill>
+          <a:blip r:embed="rId3"/>
+          <a:stretch>
+            <a:fillRect/>
+          </a:stretch>
+        </p:blipFill>
+        <p:spPr>
+          <a:xfrm>
+            <a:off x="7512723" y="618999"/>
+            <a:ext cx="4410691" cy="5973009"/>
+          </a:xfrm>
+          <a:prstGeom prst="rect">
+            <a:avLst/>
+          </a:prstGeom>
+        </p:spPr>
+      </p:pic>
+    </p:spTree>
+    <p:extLst>
+      <p:ext uri="{BB962C8B-B14F-4D97-AF65-F5344CB8AC3E}">
+        <p14:creationId xmlns:p14="http://schemas.microsoft.com/office/powerpoint/2010/main" val="2167340291"/>
+      </p:ext>
+    </p:extLst>
+  </p:cSld>
+  <p:clrMapOvr>
+    <a:masterClrMapping/>
+  </p:clrMapOvr>
+</p:sld>
+</file>
+
+<file path=ppt/slides/slide23.xml><?xml version="1.0" encoding="utf-8"?>
+<p:sld xmlns:a="http://schemas.openxmlformats.org/drawingml/2006/main" xmlns:r="http://schemas.openxmlformats.org/officeDocument/2006/relationships" xmlns:p="http://schemas.openxmlformats.org/presentationml/2006/main">
+  <p:cSld>
+    <p:spTree>
+      <p:nvGrpSpPr>
+        <p:cNvPr id="1" name=""/>
+        <p:cNvGrpSpPr/>
+        <p:nvPr/>
+      </p:nvGrpSpPr>
+      <p:grpSpPr>
+        <a:xfrm>
+          <a:off x="0" y="0"/>
+          <a:ext cx="0" cy="0"/>
+          <a:chOff x="0" y="0"/>
+          <a:chExt cx="0" cy="0"/>
+        </a:xfrm>
+      </p:grpSpPr>
+      <p:sp>
+        <p:nvSpPr>
+          <p:cNvPr id="2" name="Titre 1">
+            <a:extLst>
+              <a:ext uri="{FF2B5EF4-FFF2-40B4-BE49-F238E27FC236}">
+                <a16:creationId xmlns:a16="http://schemas.microsoft.com/office/drawing/2014/main" id="{7F8D075F-CA69-433A-B864-FE75DE909F16}"/>
+              </a:ext>
+            </a:extLst>
+          </p:cNvPr>
+          <p:cNvSpPr>
+            <a:spLocks noGrp="1"/>
+          </p:cNvSpPr>
+          <p:nvPr>
+            <p:ph type="title"/>
+          </p:nvPr>
+        </p:nvSpPr>
+        <p:spPr/>
+        <p:txBody>
+          <a:bodyPr/>
+          <a:lstStyle/>
+          <a:p>
+            <a:r>
+              <a:rPr lang="fr-FR" dirty="0"/>
+              <a:t>Adapter le site en mobile-first</a:t>
+            </a:r>
+          </a:p>
+        </p:txBody>
+      </p:sp>
+      <p:pic>
+        <p:nvPicPr>
+          <p:cNvPr id="8" name="Espace réservé du contenu 7">
+            <a:extLst>
+              <a:ext uri="{FF2B5EF4-FFF2-40B4-BE49-F238E27FC236}">
+                <a16:creationId xmlns:a16="http://schemas.microsoft.com/office/drawing/2014/main" id="{C93E9712-6B99-47DA-8FC4-08EBE7DEC38A}"/>
+              </a:ext>
+            </a:extLst>
+          </p:cNvPr>
+          <p:cNvPicPr>
+            <a:picLocks noGrp="1" noChangeAspect="1"/>
+          </p:cNvPicPr>
+          <p:nvPr>
+            <p:ph idx="1"/>
+          </p:nvPr>
+        </p:nvPicPr>
+        <p:blipFill>
+          <a:blip r:embed="rId2"/>
+          <a:stretch>
+            <a:fillRect/>
+          </a:stretch>
+        </p:blipFill>
+        <p:spPr>
+          <a:xfrm>
+            <a:off x="1881808" y="2135372"/>
+            <a:ext cx="3788617" cy="4614647"/>
+          </a:xfrm>
+        </p:spPr>
+      </p:pic>
+      <p:pic>
+        <p:nvPicPr>
+          <p:cNvPr id="10" name="Image 9">
+            <a:extLst>
+              <a:ext uri="{FF2B5EF4-FFF2-40B4-BE49-F238E27FC236}">
+                <a16:creationId xmlns:a16="http://schemas.microsoft.com/office/drawing/2014/main" id="{C9782136-7BB3-4E64-B4D9-891E29108B8E}"/>
+              </a:ext>
+            </a:extLst>
+          </p:cNvPr>
+          <p:cNvPicPr>
+            <a:picLocks noChangeAspect="1"/>
+          </p:cNvPicPr>
+          <p:nvPr/>
+        </p:nvPicPr>
+        <p:blipFill>
+          <a:blip r:embed="rId3"/>
+          <a:stretch>
+            <a:fillRect/>
+          </a:stretch>
+        </p:blipFill>
+        <p:spPr>
+          <a:xfrm>
+            <a:off x="7349549" y="753228"/>
+            <a:ext cx="4525006" cy="5953956"/>
+          </a:xfrm>
+          <a:prstGeom prst="rect">
+            <a:avLst/>
+          </a:prstGeom>
+        </p:spPr>
+      </p:pic>
+    </p:spTree>
+    <p:extLst>
+      <p:ext uri="{BB962C8B-B14F-4D97-AF65-F5344CB8AC3E}">
+        <p14:creationId xmlns:p14="http://schemas.microsoft.com/office/powerpoint/2010/main" val="280921417"/>
+      </p:ext>
+    </p:extLst>
+  </p:cSld>
+  <p:clrMapOvr>
+    <a:masterClrMapping/>
+  </p:clrMapOvr>
+</p:sld>
+</file>
+
+<file path=ppt/slides/slide24.xml><?xml version="1.0" encoding="utf-8"?>
+<p:sld xmlns:a="http://schemas.openxmlformats.org/drawingml/2006/main" xmlns:r="http://schemas.openxmlformats.org/officeDocument/2006/relationships" xmlns:p="http://schemas.openxmlformats.org/presentationml/2006/main">
+  <p:cSld>
+    <p:spTree>
+      <p:nvGrpSpPr>
+        <p:cNvPr id="1" name=""/>
+        <p:cNvGrpSpPr/>
+        <p:nvPr/>
+      </p:nvGrpSpPr>
+      <p:grpSpPr>
+        <a:xfrm>
+          <a:off x="0" y="0"/>
+          <a:ext cx="0" cy="0"/>
+          <a:chOff x="0" y="0"/>
+          <a:chExt cx="0" cy="0"/>
+        </a:xfrm>
+      </p:grpSpPr>
+      <p:sp>
+        <p:nvSpPr>
+          <p:cNvPr id="2" name="Titre 1">
+            <a:extLst>
+              <a:ext uri="{FF2B5EF4-FFF2-40B4-BE49-F238E27FC236}">
+                <a16:creationId xmlns:a16="http://schemas.microsoft.com/office/drawing/2014/main" id="{7F8D075F-CA69-433A-B864-FE75DE909F16}"/>
+              </a:ext>
+            </a:extLst>
+          </p:cNvPr>
+          <p:cNvSpPr>
+            <a:spLocks noGrp="1"/>
+          </p:cNvSpPr>
+          <p:nvPr>
+            <p:ph type="title"/>
+          </p:nvPr>
+        </p:nvSpPr>
+        <p:spPr/>
+        <p:txBody>
+          <a:bodyPr/>
+          <a:lstStyle/>
+          <a:p>
+            <a:r>
+              <a:rPr lang="fr-FR" dirty="0"/>
+              <a:t>Optimiser l’architecture et la navigation</a:t>
+            </a:r>
+          </a:p>
+        </p:txBody>
+      </p:sp>
+      <p:sp>
+        <p:nvSpPr>
+          <p:cNvPr id="4" name="Espace réservé du contenu 3">
+            <a:extLst>
+              <a:ext uri="{FF2B5EF4-FFF2-40B4-BE49-F238E27FC236}">
+                <a16:creationId xmlns:a16="http://schemas.microsoft.com/office/drawing/2014/main" id="{AB8F5968-6606-4C69-A2BE-B0AF1326B811}"/>
+              </a:ext>
+            </a:extLst>
+          </p:cNvPr>
+          <p:cNvSpPr>
+            <a:spLocks noGrp="1"/>
+          </p:cNvSpPr>
+          <p:nvPr>
+            <p:ph idx="1"/>
+          </p:nvPr>
+        </p:nvSpPr>
+        <p:spPr/>
+        <p:txBody>
+          <a:bodyPr/>
+          <a:lstStyle/>
+          <a:p>
+            <a:r>
+              <a:rPr lang="fr-FR" dirty="0"/>
+              <a:t>Avant</a:t>
+            </a:r>
+          </a:p>
+          <a:p>
+            <a:endParaRPr lang="fr-FR" dirty="0"/>
+          </a:p>
+          <a:p>
+            <a:endParaRPr lang="fr-FR" dirty="0"/>
+          </a:p>
+          <a:p>
+            <a:pPr marL="0" indent="0">
+              <a:buNone/>
+            </a:pPr>
+            <a:endParaRPr lang="fr-FR" dirty="0"/>
+          </a:p>
+          <a:p>
+            <a:r>
+              <a:rPr lang="fr-FR" dirty="0"/>
+              <a:t>Après</a:t>
+            </a:r>
+          </a:p>
+        </p:txBody>
+      </p:sp>
+      <p:pic>
+        <p:nvPicPr>
+          <p:cNvPr id="6" name="Image 5">
+            <a:extLst>
+              <a:ext uri="{FF2B5EF4-FFF2-40B4-BE49-F238E27FC236}">
+                <a16:creationId xmlns:a16="http://schemas.microsoft.com/office/drawing/2014/main" id="{59DC43F8-18A2-46EF-AAEC-49C94AA010B8}"/>
+              </a:ext>
+            </a:extLst>
+          </p:cNvPr>
+          <p:cNvPicPr>
+            <a:picLocks noChangeAspect="1"/>
+          </p:cNvPicPr>
+          <p:nvPr/>
+        </p:nvPicPr>
+        <p:blipFill>
+          <a:blip r:embed="rId2"/>
+          <a:stretch>
+            <a:fillRect/>
+          </a:stretch>
+        </p:blipFill>
+        <p:spPr>
+          <a:xfrm>
+            <a:off x="817016" y="3061614"/>
+            <a:ext cx="10557968" cy="714664"/>
+          </a:xfrm>
+          <a:prstGeom prst="rect">
+            <a:avLst/>
+          </a:prstGeom>
+        </p:spPr>
+      </p:pic>
+      <p:pic>
+        <p:nvPicPr>
+          <p:cNvPr id="9" name="Image 8">
+            <a:extLst>
+              <a:ext uri="{FF2B5EF4-FFF2-40B4-BE49-F238E27FC236}">
+                <a16:creationId xmlns:a16="http://schemas.microsoft.com/office/drawing/2014/main" id="{36DF1073-2BD8-40E5-AF63-4810A89531B8}"/>
+              </a:ext>
+            </a:extLst>
+          </p:cNvPr>
+          <p:cNvPicPr>
+            <a:picLocks noChangeAspect="1"/>
+          </p:cNvPicPr>
+          <p:nvPr/>
+        </p:nvPicPr>
+        <p:blipFill>
+          <a:blip r:embed="rId3"/>
+          <a:stretch>
+            <a:fillRect/>
+          </a:stretch>
+        </p:blipFill>
+        <p:spPr>
+          <a:xfrm>
+            <a:off x="817016" y="4816072"/>
+            <a:ext cx="10748545" cy="762308"/>
+          </a:xfrm>
+          <a:prstGeom prst="rect">
+            <a:avLst/>
+          </a:prstGeom>
+        </p:spPr>
+      </p:pic>
+    </p:spTree>
+    <p:extLst>
+      <p:ext uri="{BB962C8B-B14F-4D97-AF65-F5344CB8AC3E}">
+        <p14:creationId xmlns:p14="http://schemas.microsoft.com/office/powerpoint/2010/main" val="4046857506"/>
+      </p:ext>
+    </p:extLst>
+  </p:cSld>
+  <p:clrMapOvr>
+    <a:masterClrMapping/>
+  </p:clrMapOvr>
+</p:sld>
+</file>
+
+<file path=ppt/slides/slide25.xml><?xml version="1.0" encoding="utf-8"?>
+<p:sld xmlns:a="http://schemas.openxmlformats.org/drawingml/2006/main" xmlns:r="http://schemas.openxmlformats.org/officeDocument/2006/relationships" xmlns:p="http://schemas.openxmlformats.org/presentationml/2006/main">
+  <p:cSld>
+    <p:spTree>
+      <p:nvGrpSpPr>
+        <p:cNvPr id="1" name=""/>
+        <p:cNvGrpSpPr/>
+        <p:nvPr/>
+      </p:nvGrpSpPr>
+      <p:grpSpPr>
+        <a:xfrm>
+          <a:off x="0" y="0"/>
+          <a:ext cx="0" cy="0"/>
+          <a:chOff x="0" y="0"/>
+          <a:chExt cx="0" cy="0"/>
+        </a:xfrm>
+      </p:grpSpPr>
+      <p:sp>
+        <p:nvSpPr>
+          <p:cNvPr id="2" name="Titre 1">
+            <a:extLst>
+              <a:ext uri="{FF2B5EF4-FFF2-40B4-BE49-F238E27FC236}">
+                <a16:creationId xmlns:a16="http://schemas.microsoft.com/office/drawing/2014/main" id="{015F7A59-CC74-4AE8-889B-B700A5279E31}"/>
+              </a:ext>
+            </a:extLst>
+          </p:cNvPr>
+          <p:cNvSpPr>
+            <a:spLocks noGrp="1"/>
+          </p:cNvSpPr>
+          <p:nvPr>
+            <p:ph type="title"/>
+          </p:nvPr>
+        </p:nvSpPr>
+        <p:spPr/>
+        <p:txBody>
+          <a:bodyPr/>
+          <a:lstStyle/>
+          <a:p>
+            <a:r>
+              <a:rPr lang="fr-FR" dirty="0"/>
+              <a:t>Intégrer le formulaire en bas de page</a:t>
+            </a:r>
+          </a:p>
+        </p:txBody>
+      </p:sp>
+      <p:sp>
+        <p:nvSpPr>
+          <p:cNvPr id="3" name="Espace réservé du contenu 2">
+            <a:extLst>
+              <a:ext uri="{FF2B5EF4-FFF2-40B4-BE49-F238E27FC236}">
+                <a16:creationId xmlns:a16="http://schemas.microsoft.com/office/drawing/2014/main" id="{632E58F3-655F-4BB6-9355-1FC7D7A376BD}"/>
+              </a:ext>
+            </a:extLst>
+          </p:cNvPr>
+          <p:cNvSpPr>
+            <a:spLocks noGrp="1"/>
+          </p:cNvSpPr>
+          <p:nvPr>
+            <p:ph idx="1"/>
+          </p:nvPr>
+        </p:nvSpPr>
+        <p:spPr/>
+        <p:txBody>
+          <a:bodyPr/>
+          <a:lstStyle/>
+          <a:p>
+            <a:r>
+              <a:rPr lang="fr-FR" dirty="0"/>
+              <a:t>Avant</a:t>
+            </a:r>
+          </a:p>
+          <a:p>
+            <a:endParaRPr lang="fr-FR" dirty="0"/>
+          </a:p>
+        </p:txBody>
+      </p:sp>
+      <p:pic>
+        <p:nvPicPr>
+          <p:cNvPr id="5" name="Image 4">
+            <a:extLst>
+              <a:ext uri="{FF2B5EF4-FFF2-40B4-BE49-F238E27FC236}">
+                <a16:creationId xmlns:a16="http://schemas.microsoft.com/office/drawing/2014/main" id="{A9EEA1E7-504B-4324-8F04-784B0DEFAD85}"/>
+              </a:ext>
+            </a:extLst>
+          </p:cNvPr>
+          <p:cNvPicPr>
+            <a:picLocks noChangeAspect="1"/>
+          </p:cNvPicPr>
+          <p:nvPr/>
+        </p:nvPicPr>
+        <p:blipFill>
+          <a:blip r:embed="rId2"/>
+          <a:stretch>
+            <a:fillRect/>
+          </a:stretch>
+        </p:blipFill>
+        <p:spPr>
+          <a:xfrm>
+            <a:off x="2145381" y="2336873"/>
+            <a:ext cx="8920184" cy="4108466"/>
+          </a:xfrm>
+          <a:prstGeom prst="rect">
+            <a:avLst/>
+          </a:prstGeom>
+        </p:spPr>
+      </p:pic>
+    </p:spTree>
+    <p:extLst>
+      <p:ext uri="{BB962C8B-B14F-4D97-AF65-F5344CB8AC3E}">
+        <p14:creationId xmlns:p14="http://schemas.microsoft.com/office/powerpoint/2010/main" val="2809825309"/>
+      </p:ext>
+    </p:extLst>
+  </p:cSld>
+  <p:clrMapOvr>
+    <a:masterClrMapping/>
+  </p:clrMapOvr>
+</p:sld>
+</file>
+
+<file path=ppt/slides/slide26.xml><?xml version="1.0" encoding="utf-8"?>
+<p:sld xmlns:a="http://schemas.openxmlformats.org/drawingml/2006/main" xmlns:r="http://schemas.openxmlformats.org/officeDocument/2006/relationships" xmlns:p="http://schemas.openxmlformats.org/presentationml/2006/main">
+  <p:cSld>
+    <p:spTree>
+      <p:nvGrpSpPr>
+        <p:cNvPr id="1" name=""/>
+        <p:cNvGrpSpPr/>
+        <p:nvPr/>
+      </p:nvGrpSpPr>
+      <p:grpSpPr>
+        <a:xfrm>
+          <a:off x="0" y="0"/>
+          <a:ext cx="0" cy="0"/>
+          <a:chOff x="0" y="0"/>
+          <a:chExt cx="0" cy="0"/>
+        </a:xfrm>
+      </p:grpSpPr>
+      <p:sp>
+        <p:nvSpPr>
+          <p:cNvPr id="2" name="Titre 1">
+            <a:extLst>
+              <a:ext uri="{FF2B5EF4-FFF2-40B4-BE49-F238E27FC236}">
+                <a16:creationId xmlns:a16="http://schemas.microsoft.com/office/drawing/2014/main" id="{015F7A59-CC74-4AE8-889B-B700A5279E31}"/>
+              </a:ext>
+            </a:extLst>
+          </p:cNvPr>
+          <p:cNvSpPr>
+            <a:spLocks noGrp="1"/>
+          </p:cNvSpPr>
+          <p:nvPr>
+            <p:ph type="title"/>
+          </p:nvPr>
+        </p:nvSpPr>
+        <p:spPr/>
+        <p:txBody>
+          <a:bodyPr/>
+          <a:lstStyle/>
+          <a:p>
+            <a:r>
+              <a:rPr lang="fr-FR" dirty="0"/>
+              <a:t>Intégrer le formulaire en bas de page</a:t>
+            </a:r>
+          </a:p>
+        </p:txBody>
+      </p:sp>
+      <p:sp>
+        <p:nvSpPr>
+          <p:cNvPr id="3" name="Espace réservé du contenu 2">
+            <a:extLst>
+              <a:ext uri="{FF2B5EF4-FFF2-40B4-BE49-F238E27FC236}">
+                <a16:creationId xmlns:a16="http://schemas.microsoft.com/office/drawing/2014/main" id="{632E58F3-655F-4BB6-9355-1FC7D7A376BD}"/>
+              </a:ext>
+            </a:extLst>
+          </p:cNvPr>
+          <p:cNvSpPr>
+            <a:spLocks noGrp="1"/>
+          </p:cNvSpPr>
+          <p:nvPr>
+            <p:ph idx="1"/>
+          </p:nvPr>
+        </p:nvSpPr>
+        <p:spPr/>
+        <p:txBody>
+          <a:bodyPr/>
+          <a:lstStyle/>
+          <a:p>
+            <a:r>
+              <a:rPr lang="fr-FR" dirty="0"/>
+              <a:t>Après </a:t>
+            </a:r>
+          </a:p>
+          <a:p>
+            <a:endParaRPr lang="fr-FR" dirty="0"/>
+          </a:p>
+        </p:txBody>
+      </p:sp>
+      <p:pic>
+        <p:nvPicPr>
+          <p:cNvPr id="6" name="Image 5">
+            <a:extLst>
+              <a:ext uri="{FF2B5EF4-FFF2-40B4-BE49-F238E27FC236}">
+                <a16:creationId xmlns:a16="http://schemas.microsoft.com/office/drawing/2014/main" id="{FE2D5A43-5398-42E6-B9CE-7904044CA8D6}"/>
+              </a:ext>
+            </a:extLst>
+          </p:cNvPr>
+          <p:cNvPicPr>
+            <a:picLocks noChangeAspect="1"/>
+          </p:cNvPicPr>
+          <p:nvPr/>
+        </p:nvPicPr>
+        <p:blipFill>
+          <a:blip r:embed="rId2"/>
+          <a:stretch>
+            <a:fillRect/>
+          </a:stretch>
+        </p:blipFill>
+        <p:spPr>
+          <a:xfrm>
+            <a:off x="2400791" y="2216932"/>
+            <a:ext cx="8834130" cy="4210076"/>
+          </a:xfrm>
+          <a:prstGeom prst="rect">
+            <a:avLst/>
+          </a:prstGeom>
+        </p:spPr>
+      </p:pic>
+    </p:spTree>
+    <p:extLst>
+      <p:ext uri="{BB962C8B-B14F-4D97-AF65-F5344CB8AC3E}">
+        <p14:creationId xmlns:p14="http://schemas.microsoft.com/office/powerpoint/2010/main" val="1627254986"/>
+      </p:ext>
+    </p:extLst>
+  </p:cSld>
+  <p:clrMapOvr>
+    <a:masterClrMapping/>
+  </p:clrMapOvr>
+</p:sld>
+</file>
+
+<file path=ppt/slides/slide27.xml><?xml version="1.0" encoding="utf-8"?>
+<p:sld xmlns:a="http://schemas.openxmlformats.org/drawingml/2006/main" xmlns:r="http://schemas.openxmlformats.org/officeDocument/2006/relationships" xmlns:p="http://schemas.openxmlformats.org/presentationml/2006/main">
+  <p:cSld>
+    <p:spTree>
+      <p:nvGrpSpPr>
+        <p:cNvPr id="1" name=""/>
+        <p:cNvGrpSpPr/>
+        <p:nvPr/>
+      </p:nvGrpSpPr>
+      <p:grpSpPr>
+        <a:xfrm>
+          <a:off x="0" y="0"/>
+          <a:ext cx="0" cy="0"/>
+          <a:chOff x="0" y="0"/>
+          <a:chExt cx="0" cy="0"/>
+        </a:xfrm>
+      </p:grpSpPr>
+      <p:sp>
+        <p:nvSpPr>
+          <p:cNvPr id="2" name="Titre 1">
+            <a:extLst>
+              <a:ext uri="{FF2B5EF4-FFF2-40B4-BE49-F238E27FC236}">
+                <a16:creationId xmlns:a16="http://schemas.microsoft.com/office/drawing/2014/main" id="{210F176C-2127-438D-B495-162CE17844B1}"/>
+              </a:ext>
+            </a:extLst>
+          </p:cNvPr>
+          <p:cNvSpPr>
+            <a:spLocks noGrp="1"/>
+          </p:cNvSpPr>
+          <p:nvPr>
+            <p:ph type="title"/>
+          </p:nvPr>
+        </p:nvSpPr>
+        <p:spPr/>
+        <p:txBody>
+          <a:bodyPr/>
+          <a:lstStyle/>
+          <a:p>
+            <a:r>
+              <a:rPr lang="fr-FR" dirty="0"/>
+              <a:t>Comparaison Avant-Après</a:t>
+            </a:r>
+          </a:p>
+        </p:txBody>
+      </p:sp>
+      <p:sp>
+        <p:nvSpPr>
+          <p:cNvPr id="3" name="Espace réservé du contenu 2">
+            <a:extLst>
+              <a:ext uri="{FF2B5EF4-FFF2-40B4-BE49-F238E27FC236}">
+                <a16:creationId xmlns:a16="http://schemas.microsoft.com/office/drawing/2014/main" id="{AD16BD5A-FF7B-4B13-92BD-287100FFF5B8}"/>
+              </a:ext>
+            </a:extLst>
+          </p:cNvPr>
+          <p:cNvSpPr>
+            <a:spLocks noGrp="1"/>
+          </p:cNvSpPr>
+          <p:nvPr>
+            <p:ph idx="1"/>
+          </p:nvPr>
+        </p:nvSpPr>
+        <p:spPr/>
+        <p:txBody>
+          <a:bodyPr/>
+          <a:lstStyle/>
+          <a:p>
+            <a:r>
+              <a:rPr lang="fr-FR" dirty="0"/>
+              <a:t>Améliorer l’accessibilité du site sur la langue</a:t>
+            </a:r>
+          </a:p>
+          <a:p>
+            <a:endParaRPr lang="fr-FR" dirty="0"/>
+          </a:p>
+          <a:p>
+            <a:pPr lvl="1"/>
+            <a:r>
+              <a:rPr lang="fr-FR" dirty="0"/>
+              <a:t>Avant</a:t>
+            </a:r>
+          </a:p>
+          <a:p>
+            <a:pPr lvl="1"/>
+            <a:endParaRPr lang="fr-FR" dirty="0"/>
+          </a:p>
+          <a:p>
+            <a:pPr lvl="1"/>
+            <a:endParaRPr lang="fr-FR" dirty="0"/>
+          </a:p>
+          <a:p>
+            <a:pPr lvl="1"/>
+            <a:endParaRPr lang="fr-FR" dirty="0"/>
+          </a:p>
+          <a:p>
+            <a:pPr lvl="1"/>
+            <a:r>
+              <a:rPr lang="fr-FR" dirty="0"/>
+              <a:t>Après</a:t>
+            </a:r>
+          </a:p>
+          <a:p>
+            <a:pPr lvl="1"/>
+            <a:endParaRPr lang="fr-FR" dirty="0"/>
+          </a:p>
+          <a:p>
+            <a:pPr marL="457200" lvl="1" indent="0">
+              <a:buNone/>
+            </a:pPr>
+            <a:endParaRPr lang="fr-FR" dirty="0"/>
+          </a:p>
+        </p:txBody>
+      </p:sp>
+      <p:pic>
+        <p:nvPicPr>
+          <p:cNvPr id="5" name="Image 4">
+            <a:extLst>
+              <a:ext uri="{FF2B5EF4-FFF2-40B4-BE49-F238E27FC236}">
+                <a16:creationId xmlns:a16="http://schemas.microsoft.com/office/drawing/2014/main" id="{295EA66A-C411-437F-AB9B-75A363EEB070}"/>
+              </a:ext>
+            </a:extLst>
+          </p:cNvPr>
+          <p:cNvPicPr>
+            <a:picLocks noChangeAspect="1"/>
+          </p:cNvPicPr>
+          <p:nvPr/>
+        </p:nvPicPr>
+        <p:blipFill>
+          <a:blip r:embed="rId2"/>
+          <a:stretch>
+            <a:fillRect/>
+          </a:stretch>
+        </p:blipFill>
+        <p:spPr>
+          <a:xfrm>
+            <a:off x="2902226" y="3518452"/>
+            <a:ext cx="3635563" cy="426519"/>
+          </a:xfrm>
+          <a:prstGeom prst="rect">
+            <a:avLst/>
+          </a:prstGeom>
+        </p:spPr>
+      </p:pic>
+      <p:pic>
+        <p:nvPicPr>
+          <p:cNvPr id="7" name="Image 6">
+            <a:extLst>
+              <a:ext uri="{FF2B5EF4-FFF2-40B4-BE49-F238E27FC236}">
+                <a16:creationId xmlns:a16="http://schemas.microsoft.com/office/drawing/2014/main" id="{AFF4A6DB-76DB-4B60-9279-C06A2D740F3D}"/>
+              </a:ext>
+            </a:extLst>
+          </p:cNvPr>
+          <p:cNvPicPr>
+            <a:picLocks noChangeAspect="1"/>
+          </p:cNvPicPr>
+          <p:nvPr/>
+        </p:nvPicPr>
+        <p:blipFill>
+          <a:blip r:embed="rId3"/>
+          <a:stretch>
+            <a:fillRect/>
+          </a:stretch>
+        </p:blipFill>
+        <p:spPr>
+          <a:xfrm>
+            <a:off x="2902226" y="4881348"/>
+            <a:ext cx="3397444" cy="562168"/>
+          </a:xfrm>
+          <a:prstGeom prst="rect">
+            <a:avLst/>
+          </a:prstGeom>
+        </p:spPr>
+      </p:pic>
+    </p:spTree>
+    <p:extLst>
+      <p:ext uri="{BB962C8B-B14F-4D97-AF65-F5344CB8AC3E}">
+        <p14:creationId xmlns:p14="http://schemas.microsoft.com/office/powerpoint/2010/main" val="2762365754"/>
       </p:ext>
     </p:extLst>
   </p:cSld>

</xml_diff>